<commit_message>
kleine Änderungen an Folien
</commit_message>
<xml_diff>
--- a/Folien/Exkurs_Fehlersuche.pptx
+++ b/Folien/Exkurs_Fehlersuche.pptx
@@ -654,7 +654,7 @@
           <a:p>
             <a:fld id="{1111EAE3-0D17-7D4D-B5C8-7430D3A14508}" type="datetimeFigureOut">
               <a:rPr lang="en-US" smtClean="0"/>
-              <a:t>3/24/22</a:t>
+              <a:t>3/29/22</a:t>
             </a:fld>
             <a:endParaRPr lang="en-US"/>
           </a:p>
@@ -1153,7 +1153,7 @@
           <a:p>
             <a:fld id="{46878720-212C-42BB-B356-99628BFE1EBF}" type="datetimeFigureOut">
               <a:rPr lang="en-US" smtClean="0"/>
-              <a:t>3/24/22</a:t>
+              <a:t>3/29/22</a:t>
             </a:fld>
             <a:endParaRPr lang="en-US"/>
           </a:p>
@@ -1351,7 +1351,7 @@
           <a:p>
             <a:fld id="{46878720-212C-42BB-B356-99628BFE1EBF}" type="datetimeFigureOut">
               <a:rPr lang="en-US" smtClean="0"/>
-              <a:t>3/24/22</a:t>
+              <a:t>3/29/22</a:t>
             </a:fld>
             <a:endParaRPr lang="en-US"/>
           </a:p>
@@ -1559,7 +1559,7 @@
           <a:p>
             <a:fld id="{46878720-212C-42BB-B356-99628BFE1EBF}" type="datetimeFigureOut">
               <a:rPr lang="en-US" smtClean="0"/>
-              <a:t>3/24/22</a:t>
+              <a:t>3/29/22</a:t>
             </a:fld>
             <a:endParaRPr lang="en-US"/>
           </a:p>
@@ -1757,7 +1757,7 @@
           <a:p>
             <a:fld id="{46878720-212C-42BB-B356-99628BFE1EBF}" type="datetimeFigureOut">
               <a:rPr lang="en-US" smtClean="0"/>
-              <a:t>3/24/22</a:t>
+              <a:t>3/29/22</a:t>
             </a:fld>
             <a:endParaRPr lang="en-US"/>
           </a:p>
@@ -2032,7 +2032,7 @@
           <a:p>
             <a:fld id="{46878720-212C-42BB-B356-99628BFE1EBF}" type="datetimeFigureOut">
               <a:rPr lang="en-US" smtClean="0"/>
-              <a:t>3/24/22</a:t>
+              <a:t>3/29/22</a:t>
             </a:fld>
             <a:endParaRPr lang="en-US"/>
           </a:p>
@@ -2297,7 +2297,7 @@
           <a:p>
             <a:fld id="{46878720-212C-42BB-B356-99628BFE1EBF}" type="datetimeFigureOut">
               <a:rPr lang="en-US" smtClean="0"/>
-              <a:t>3/24/22</a:t>
+              <a:t>3/29/22</a:t>
             </a:fld>
             <a:endParaRPr lang="en-US"/>
           </a:p>
@@ -2709,7 +2709,7 @@
           <a:p>
             <a:fld id="{46878720-212C-42BB-B356-99628BFE1EBF}" type="datetimeFigureOut">
               <a:rPr lang="en-US" smtClean="0"/>
-              <a:t>3/24/22</a:t>
+              <a:t>3/29/22</a:t>
             </a:fld>
             <a:endParaRPr lang="en-US"/>
           </a:p>
@@ -2850,7 +2850,7 @@
           <a:p>
             <a:fld id="{46878720-212C-42BB-B356-99628BFE1EBF}" type="datetimeFigureOut">
               <a:rPr lang="en-US" smtClean="0"/>
-              <a:t>3/24/22</a:t>
+              <a:t>3/29/22</a:t>
             </a:fld>
             <a:endParaRPr lang="en-US"/>
           </a:p>
@@ -2963,7 +2963,7 @@
           <a:p>
             <a:fld id="{46878720-212C-42BB-B356-99628BFE1EBF}" type="datetimeFigureOut">
               <a:rPr lang="en-US" smtClean="0"/>
-              <a:t>3/24/22</a:t>
+              <a:t>3/29/22</a:t>
             </a:fld>
             <a:endParaRPr lang="en-US"/>
           </a:p>
@@ -3274,7 +3274,7 @@
           <a:p>
             <a:fld id="{46878720-212C-42BB-B356-99628BFE1EBF}" type="datetimeFigureOut">
               <a:rPr lang="en-US" smtClean="0"/>
-              <a:t>3/24/22</a:t>
+              <a:t>3/29/22</a:t>
             </a:fld>
             <a:endParaRPr lang="en-US"/>
           </a:p>
@@ -3562,7 +3562,7 @@
           <a:p>
             <a:fld id="{46878720-212C-42BB-B356-99628BFE1EBF}" type="datetimeFigureOut">
               <a:rPr lang="en-US" smtClean="0"/>
-              <a:t>3/24/22</a:t>
+              <a:t>3/29/22</a:t>
             </a:fld>
             <a:endParaRPr lang="en-US"/>
           </a:p>
@@ -3803,7 +3803,7 @@
           <a:p>
             <a:fld id="{46878720-212C-42BB-B356-99628BFE1EBF}" type="datetimeFigureOut">
               <a:rPr lang="en-US" smtClean="0"/>
-              <a:t>3/24/22</a:t>
+              <a:t>3/29/22</a:t>
             </a:fld>
             <a:endParaRPr lang="en-US"/>
           </a:p>
@@ -7263,7 +7263,15 @@
           <a:p>
             <a:r>
               <a:rPr lang="de-DE" dirty="0"/>
-              <a:t>Nur mit manchen Boards unterstützt (SAMD MKR Boards wie MKR Zero)</a:t>
+              <a:t>Nur mit manchen Boards unterstützt (</a:t>
+            </a:r>
+            <a:r>
+              <a:rPr lang="de-DE"/>
+              <a:t>SAMD21 basierende </a:t>
+            </a:r>
+            <a:r>
+              <a:rPr lang="de-DE" dirty="0"/>
+              <a:t>Boards wie MKR Zero)</a:t>
             </a:r>
           </a:p>
         </p:txBody>
@@ -7949,15 +7957,6 @@
 </file>
 
 <file path=customXml/item1.xml><?xml version="1.0" encoding="utf-8"?>
-<?mso-contentType ?>
-<FormTemplates xmlns="http://schemas.microsoft.com/sharepoint/v3/contenttype/forms">
-  <Display>DocumentLibraryForm</Display>
-  <Edit>DocumentLibraryForm</Edit>
-  <New>DocumentLibraryForm</New>
-</FormTemplates>
-</file>
-
-<file path=customXml/item2.xml><?xml version="1.0" encoding="utf-8"?>
 <ct:contentTypeSchema xmlns:ct="http://schemas.microsoft.com/office/2006/metadata/contentType" xmlns:ma="http://schemas.microsoft.com/office/2006/metadata/properties/metaAttributes" ct:_="" ma:_="" ma:contentTypeName="Document" ma:contentTypeID="0x010100B4B9B92454B73847AA0367335585965E" ma:contentTypeVersion="12" ma:contentTypeDescription="Create a new document." ma:contentTypeScope="" ma:versionID="e03bd757301da460c704f3115d541a61">
   <xsd:schema xmlns:xsd="http://www.w3.org/2001/XMLSchema" xmlns:xs="http://www.w3.org/2001/XMLSchema" xmlns:p="http://schemas.microsoft.com/office/2006/metadata/properties" xmlns:ns2="7e0397fa-c04e-494e-b1f1-774ad14ae133" xmlns:ns3="8413540a-1bb6-4053-94a1-f89835fea1c0" targetNamespace="http://schemas.microsoft.com/office/2006/metadata/properties" ma:root="true" ma:fieldsID="8a43826bbb8ef7d01dc3ce4144ed7f57" ns2:_="" ns3:_="">
     <xsd:import namespace="7e0397fa-c04e-494e-b1f1-774ad14ae133"/>
@@ -8174,6 +8173,15 @@
 </ct:contentTypeSchema>
 </file>
 
+<file path=customXml/item2.xml><?xml version="1.0" encoding="utf-8"?>
+<?mso-contentType ?>
+<FormTemplates xmlns="http://schemas.microsoft.com/sharepoint/v3/contenttype/forms">
+  <Display>DocumentLibraryForm</Display>
+  <Edit>DocumentLibraryForm</Edit>
+  <New>DocumentLibraryForm</New>
+</FormTemplates>
+</file>
+
 <file path=customXml/item3.xml><?xml version="1.0" encoding="utf-8"?>
 <p:properties xmlns:p="http://schemas.microsoft.com/office/2006/metadata/properties" xmlns:xsi="http://www.w3.org/2001/XMLSchema-instance" xmlns:pc="http://schemas.microsoft.com/office/infopath/2007/PartnerControls">
   <documentManagement/>
@@ -8181,14 +8189,6 @@
 </file>
 
 <file path=customXml/itemProps1.xml><?xml version="1.0" encoding="utf-8"?>
-<ds:datastoreItem xmlns:ds="http://schemas.openxmlformats.org/officeDocument/2006/customXml" ds:itemID="{19285E5B-5F99-40AB-B4B4-B67FE3E29063}">
-  <ds:schemaRefs>
-    <ds:schemaRef ds:uri="http://schemas.microsoft.com/sharepoint/v3/contenttype/forms"/>
-  </ds:schemaRefs>
-</ds:datastoreItem>
-</file>
-
-<file path=customXml/itemProps2.xml><?xml version="1.0" encoding="utf-8"?>
 <ds:datastoreItem xmlns:ds="http://schemas.openxmlformats.org/officeDocument/2006/customXml" ds:itemID="{A66B1A69-4B86-4CD0-9260-0F88A0083DD6}">
   <ds:schemaRefs>
     <ds:schemaRef ds:uri="http://schemas.microsoft.com/office/2006/metadata/contentType"/>
@@ -8203,6 +8203,14 @@
     <ds:schemaRef ds:uri="http://purl.org/dc/elements/1.1/"/>
     <ds:schemaRef ds:uri="http://purl.org/dc/terms/"/>
     <ds:schemaRef ds:uri="http://schemas.microsoft.com/internal/obd"/>
+  </ds:schemaRefs>
+</ds:datastoreItem>
+</file>
+
+<file path=customXml/itemProps2.xml><?xml version="1.0" encoding="utf-8"?>
+<ds:datastoreItem xmlns:ds="http://schemas.openxmlformats.org/officeDocument/2006/customXml" ds:itemID="{19285E5B-5F99-40AB-B4B4-B67FE3E29063}">
+  <ds:schemaRefs>
+    <ds:schemaRef ds:uri="http://schemas.microsoft.com/sharepoint/v3/contenttype/forms"/>
   </ds:schemaRefs>
 </ds:datastoreItem>
 </file>

</xml_diff>

<commit_message>
add pollev to debugging
</commit_message>
<xml_diff>
--- a/Folien/Exkurs_Fehlersuche.pptx
+++ b/Folien/Exkurs_Fehlersuche.pptx
@@ -5,7 +5,7 @@
     <p:sldMasterId id="2147483648" r:id="rId4"/>
   </p:sldMasterIdLst>
   <p:notesMasterIdLst>
-    <p:notesMasterId r:id="rId15"/>
+    <p:notesMasterId r:id="rId18"/>
   </p:notesMasterIdLst>
   <p:sldIdLst>
     <p:sldId id="291" r:id="rId5"/>
@@ -13,11 +13,14 @@
     <p:sldId id="317" r:id="rId7"/>
     <p:sldId id="318" r:id="rId8"/>
     <p:sldId id="320" r:id="rId9"/>
-    <p:sldId id="323" r:id="rId10"/>
-    <p:sldId id="324" r:id="rId11"/>
-    <p:sldId id="321" r:id="rId12"/>
-    <p:sldId id="322" r:id="rId13"/>
-    <p:sldId id="315" r:id="rId14"/>
+    <p:sldId id="326" r:id="rId10"/>
+    <p:sldId id="327" r:id="rId11"/>
+    <p:sldId id="323" r:id="rId12"/>
+    <p:sldId id="324" r:id="rId13"/>
+    <p:sldId id="325" r:id="rId14"/>
+    <p:sldId id="321" r:id="rId15"/>
+    <p:sldId id="322" r:id="rId16"/>
+    <p:sldId id="315" r:id="rId17"/>
   </p:sldIdLst>
   <p:sldSz cx="12192000" cy="6858000"/>
   <p:notesSz cx="6858000" cy="9144000"/>
@@ -654,7 +657,7 @@
           <a:p>
             <a:fld id="{1111EAE3-0D17-7D4D-B5C8-7430D3A14508}" type="datetimeFigureOut">
               <a:rPr lang="en-US" smtClean="0"/>
-              <a:t>3/29/22</a:t>
+              <a:t>11/8/23</a:t>
             </a:fld>
             <a:endParaRPr lang="en-US"/>
           </a:p>
@@ -1006,6 +1009,879 @@
 </p:notes>
 </file>
 
+<file path=ppt/notesSlides/notesSlide10.xml><?xml version="1.0" encoding="utf-8"?>
+<p:notes xmlns:a="http://schemas.openxmlformats.org/drawingml/2006/main" xmlns:r="http://schemas.openxmlformats.org/officeDocument/2006/relationships" xmlns:p="http://schemas.openxmlformats.org/presentationml/2006/main">
+  <p:cSld>
+    <p:spTree>
+      <p:nvGrpSpPr>
+        <p:cNvPr id="1" name=""/>
+        <p:cNvGrpSpPr/>
+        <p:nvPr/>
+      </p:nvGrpSpPr>
+      <p:grpSpPr>
+        <a:xfrm>
+          <a:off x="0" y="0"/>
+          <a:ext cx="0" cy="0"/>
+          <a:chOff x="0" y="0"/>
+          <a:chExt cx="0" cy="0"/>
+        </a:xfrm>
+      </p:grpSpPr>
+      <p:sp>
+        <p:nvSpPr>
+          <p:cNvPr id="2" name="Folienbildplatzhalter 1"/>
+          <p:cNvSpPr>
+            <a:spLocks noGrp="1" noRot="1" noChangeAspect="1"/>
+          </p:cNvSpPr>
+          <p:nvPr>
+            <p:ph type="sldImg"/>
+          </p:nvPr>
+        </p:nvSpPr>
+        <p:spPr/>
+      </p:sp>
+      <p:sp>
+        <p:nvSpPr>
+          <p:cNvPr id="3" name="Notizenplatzhalter 2"/>
+          <p:cNvSpPr>
+            <a:spLocks noGrp="1"/>
+          </p:cNvSpPr>
+          <p:nvPr>
+            <p:ph type="body" idx="1"/>
+          </p:nvPr>
+        </p:nvSpPr>
+        <p:spPr/>
+        <p:txBody>
+          <a:bodyPr/>
+          <a:lstStyle/>
+          <a:p>
+            <a:endParaRPr lang="de-DE"/>
+          </a:p>
+        </p:txBody>
+      </p:sp>
+      <p:sp>
+        <p:nvSpPr>
+          <p:cNvPr id="4" name="Foliennummernplatzhalter 3"/>
+          <p:cNvSpPr>
+            <a:spLocks noGrp="1"/>
+          </p:cNvSpPr>
+          <p:nvPr>
+            <p:ph type="sldNum" sz="quarter" idx="5"/>
+          </p:nvPr>
+        </p:nvSpPr>
+        <p:spPr/>
+        <p:txBody>
+          <a:bodyPr/>
+          <a:lstStyle/>
+          <a:p>
+            <a:fld id="{AD1D79F6-C8AD-5749-9DE6-19634A2965BA}" type="slidenum">
+              <a:rPr lang="en-US" smtClean="0"/>
+              <a:t>12</a:t>
+            </a:fld>
+            <a:endParaRPr lang="en-US"/>
+          </a:p>
+        </p:txBody>
+      </p:sp>
+    </p:spTree>
+    <p:extLst>
+      <p:ext uri="{BB962C8B-B14F-4D97-AF65-F5344CB8AC3E}">
+        <p14:creationId xmlns:p14="http://schemas.microsoft.com/office/powerpoint/2010/main" val="4106318288"/>
+      </p:ext>
+    </p:extLst>
+  </p:cSld>
+  <p:clrMapOvr>
+    <a:masterClrMapping/>
+  </p:clrMapOvr>
+</p:notes>
+</file>
+
+<file path=ppt/notesSlides/notesSlide11.xml><?xml version="1.0" encoding="utf-8"?>
+<p:notes xmlns:a="http://schemas.openxmlformats.org/drawingml/2006/main" xmlns:r="http://schemas.openxmlformats.org/officeDocument/2006/relationships" xmlns:p="http://schemas.openxmlformats.org/presentationml/2006/main">
+  <p:cSld>
+    <p:spTree>
+      <p:nvGrpSpPr>
+        <p:cNvPr id="1" name=""/>
+        <p:cNvGrpSpPr/>
+        <p:nvPr/>
+      </p:nvGrpSpPr>
+      <p:grpSpPr>
+        <a:xfrm>
+          <a:off x="0" y="0"/>
+          <a:ext cx="0" cy="0"/>
+          <a:chOff x="0" y="0"/>
+          <a:chExt cx="0" cy="0"/>
+        </a:xfrm>
+      </p:grpSpPr>
+      <p:sp>
+        <p:nvSpPr>
+          <p:cNvPr id="2" name="Folienbildplatzhalter 1"/>
+          <p:cNvSpPr>
+            <a:spLocks noGrp="1" noRot="1" noChangeAspect="1"/>
+          </p:cNvSpPr>
+          <p:nvPr>
+            <p:ph type="sldImg"/>
+          </p:nvPr>
+        </p:nvSpPr>
+        <p:spPr/>
+      </p:sp>
+      <p:sp>
+        <p:nvSpPr>
+          <p:cNvPr id="3" name="Notizenplatzhalter 2"/>
+          <p:cNvSpPr>
+            <a:spLocks noGrp="1"/>
+          </p:cNvSpPr>
+          <p:nvPr>
+            <p:ph type="body" idx="1"/>
+          </p:nvPr>
+        </p:nvSpPr>
+        <p:spPr/>
+        <p:txBody>
+          <a:bodyPr/>
+          <a:lstStyle/>
+          <a:p>
+            <a:endParaRPr lang="de-DE"/>
+          </a:p>
+        </p:txBody>
+      </p:sp>
+      <p:sp>
+        <p:nvSpPr>
+          <p:cNvPr id="4" name="Foliennummernplatzhalter 3"/>
+          <p:cNvSpPr>
+            <a:spLocks noGrp="1"/>
+          </p:cNvSpPr>
+          <p:nvPr>
+            <p:ph type="sldNum" sz="quarter" idx="5"/>
+          </p:nvPr>
+        </p:nvSpPr>
+        <p:spPr/>
+        <p:txBody>
+          <a:bodyPr/>
+          <a:lstStyle/>
+          <a:p>
+            <a:fld id="{AD1D79F6-C8AD-5749-9DE6-19634A2965BA}" type="slidenum">
+              <a:rPr lang="en-US" smtClean="0"/>
+              <a:t>13</a:t>
+            </a:fld>
+            <a:endParaRPr lang="en-US"/>
+          </a:p>
+        </p:txBody>
+      </p:sp>
+    </p:spTree>
+    <p:extLst>
+      <p:ext uri="{BB962C8B-B14F-4D97-AF65-F5344CB8AC3E}">
+        <p14:creationId xmlns:p14="http://schemas.microsoft.com/office/powerpoint/2010/main" val="668601332"/>
+      </p:ext>
+    </p:extLst>
+  </p:cSld>
+  <p:clrMapOvr>
+    <a:masterClrMapping/>
+  </p:clrMapOvr>
+</p:notes>
+</file>
+
+<file path=ppt/notesSlides/notesSlide2.xml><?xml version="1.0" encoding="utf-8"?>
+<p:notes xmlns:a="http://schemas.openxmlformats.org/drawingml/2006/main" xmlns:r="http://schemas.openxmlformats.org/officeDocument/2006/relationships" xmlns:p="http://schemas.openxmlformats.org/presentationml/2006/main">
+  <p:cSld>
+    <p:spTree>
+      <p:nvGrpSpPr>
+        <p:cNvPr id="1" name=""/>
+        <p:cNvGrpSpPr/>
+        <p:nvPr/>
+      </p:nvGrpSpPr>
+      <p:grpSpPr>
+        <a:xfrm>
+          <a:off x="0" y="0"/>
+          <a:ext cx="0" cy="0"/>
+          <a:chOff x="0" y="0"/>
+          <a:chExt cx="0" cy="0"/>
+        </a:xfrm>
+      </p:grpSpPr>
+      <p:sp>
+        <p:nvSpPr>
+          <p:cNvPr id="2" name="Folienbildplatzhalter 1"/>
+          <p:cNvSpPr>
+            <a:spLocks noGrp="1" noRot="1" noChangeAspect="1"/>
+          </p:cNvSpPr>
+          <p:nvPr>
+            <p:ph type="sldImg"/>
+          </p:nvPr>
+        </p:nvSpPr>
+        <p:spPr/>
+      </p:sp>
+      <p:sp>
+        <p:nvSpPr>
+          <p:cNvPr id="3" name="Notizenplatzhalter 2"/>
+          <p:cNvSpPr>
+            <a:spLocks noGrp="1"/>
+          </p:cNvSpPr>
+          <p:nvPr>
+            <p:ph type="body" idx="1"/>
+          </p:nvPr>
+        </p:nvSpPr>
+        <p:spPr/>
+        <p:txBody>
+          <a:bodyPr/>
+          <a:lstStyle/>
+          <a:p>
+            <a:endParaRPr lang="de-DE"/>
+          </a:p>
+        </p:txBody>
+      </p:sp>
+      <p:sp>
+        <p:nvSpPr>
+          <p:cNvPr id="4" name="Foliennummernplatzhalter 3"/>
+          <p:cNvSpPr>
+            <a:spLocks noGrp="1"/>
+          </p:cNvSpPr>
+          <p:nvPr>
+            <p:ph type="sldNum" sz="quarter" idx="5"/>
+          </p:nvPr>
+        </p:nvSpPr>
+        <p:spPr/>
+        <p:txBody>
+          <a:bodyPr/>
+          <a:lstStyle/>
+          <a:p>
+            <a:fld id="{AD1D79F6-C8AD-5749-9DE6-19634A2965BA}" type="slidenum">
+              <a:rPr lang="en-US" smtClean="0"/>
+              <a:t>2</a:t>
+            </a:fld>
+            <a:endParaRPr lang="en-US"/>
+          </a:p>
+        </p:txBody>
+      </p:sp>
+    </p:spTree>
+    <p:extLst>
+      <p:ext uri="{BB962C8B-B14F-4D97-AF65-F5344CB8AC3E}">
+        <p14:creationId xmlns:p14="http://schemas.microsoft.com/office/powerpoint/2010/main" val="193369365"/>
+      </p:ext>
+    </p:extLst>
+  </p:cSld>
+  <p:clrMapOvr>
+    <a:masterClrMapping/>
+  </p:clrMapOvr>
+</p:notes>
+</file>
+
+<file path=ppt/notesSlides/notesSlide3.xml><?xml version="1.0" encoding="utf-8"?>
+<p:notes xmlns:a="http://schemas.openxmlformats.org/drawingml/2006/main" xmlns:r="http://schemas.openxmlformats.org/officeDocument/2006/relationships" xmlns:p="http://schemas.openxmlformats.org/presentationml/2006/main">
+  <p:cSld>
+    <p:spTree>
+      <p:nvGrpSpPr>
+        <p:cNvPr id="1" name=""/>
+        <p:cNvGrpSpPr/>
+        <p:nvPr/>
+      </p:nvGrpSpPr>
+      <p:grpSpPr>
+        <a:xfrm>
+          <a:off x="0" y="0"/>
+          <a:ext cx="0" cy="0"/>
+          <a:chOff x="0" y="0"/>
+          <a:chExt cx="0" cy="0"/>
+        </a:xfrm>
+      </p:grpSpPr>
+      <p:sp>
+        <p:nvSpPr>
+          <p:cNvPr id="2" name="Folienbildplatzhalter 1"/>
+          <p:cNvSpPr>
+            <a:spLocks noGrp="1" noRot="1" noChangeAspect="1"/>
+          </p:cNvSpPr>
+          <p:nvPr>
+            <p:ph type="sldImg"/>
+          </p:nvPr>
+        </p:nvSpPr>
+        <p:spPr/>
+      </p:sp>
+      <p:sp>
+        <p:nvSpPr>
+          <p:cNvPr id="3" name="Notizenplatzhalter 2"/>
+          <p:cNvSpPr>
+            <a:spLocks noGrp="1"/>
+          </p:cNvSpPr>
+          <p:nvPr>
+            <p:ph type="body" idx="1"/>
+          </p:nvPr>
+        </p:nvSpPr>
+        <p:spPr/>
+        <p:txBody>
+          <a:bodyPr/>
+          <a:lstStyle/>
+          <a:p>
+            <a:endParaRPr lang="de-DE"/>
+          </a:p>
+        </p:txBody>
+      </p:sp>
+      <p:sp>
+        <p:nvSpPr>
+          <p:cNvPr id="4" name="Foliennummernplatzhalter 3"/>
+          <p:cNvSpPr>
+            <a:spLocks noGrp="1"/>
+          </p:cNvSpPr>
+          <p:nvPr>
+            <p:ph type="sldNum" sz="quarter" idx="5"/>
+          </p:nvPr>
+        </p:nvSpPr>
+        <p:spPr/>
+        <p:txBody>
+          <a:bodyPr/>
+          <a:lstStyle/>
+          <a:p>
+            <a:fld id="{AD1D79F6-C8AD-5749-9DE6-19634A2965BA}" type="slidenum">
+              <a:rPr lang="en-US" smtClean="0"/>
+              <a:t>3</a:t>
+            </a:fld>
+            <a:endParaRPr lang="en-US"/>
+          </a:p>
+        </p:txBody>
+      </p:sp>
+    </p:spTree>
+    <p:extLst>
+      <p:ext uri="{BB962C8B-B14F-4D97-AF65-F5344CB8AC3E}">
+        <p14:creationId xmlns:p14="http://schemas.microsoft.com/office/powerpoint/2010/main" val="2330948188"/>
+      </p:ext>
+    </p:extLst>
+  </p:cSld>
+  <p:clrMapOvr>
+    <a:masterClrMapping/>
+  </p:clrMapOvr>
+</p:notes>
+</file>
+
+<file path=ppt/notesSlides/notesSlide4.xml><?xml version="1.0" encoding="utf-8"?>
+<p:notes xmlns:a="http://schemas.openxmlformats.org/drawingml/2006/main" xmlns:r="http://schemas.openxmlformats.org/officeDocument/2006/relationships" xmlns:p="http://schemas.openxmlformats.org/presentationml/2006/main">
+  <p:cSld>
+    <p:spTree>
+      <p:nvGrpSpPr>
+        <p:cNvPr id="1" name=""/>
+        <p:cNvGrpSpPr/>
+        <p:nvPr/>
+      </p:nvGrpSpPr>
+      <p:grpSpPr>
+        <a:xfrm>
+          <a:off x="0" y="0"/>
+          <a:ext cx="0" cy="0"/>
+          <a:chOff x="0" y="0"/>
+          <a:chExt cx="0" cy="0"/>
+        </a:xfrm>
+      </p:grpSpPr>
+      <p:sp>
+        <p:nvSpPr>
+          <p:cNvPr id="2" name="Folienbildplatzhalter 1"/>
+          <p:cNvSpPr>
+            <a:spLocks noGrp="1" noRot="1" noChangeAspect="1"/>
+          </p:cNvSpPr>
+          <p:nvPr>
+            <p:ph type="sldImg"/>
+          </p:nvPr>
+        </p:nvSpPr>
+        <p:spPr/>
+      </p:sp>
+      <p:sp>
+        <p:nvSpPr>
+          <p:cNvPr id="3" name="Notizenplatzhalter 2"/>
+          <p:cNvSpPr>
+            <a:spLocks noGrp="1"/>
+          </p:cNvSpPr>
+          <p:nvPr>
+            <p:ph type="body" idx="1"/>
+          </p:nvPr>
+        </p:nvSpPr>
+        <p:spPr/>
+        <p:txBody>
+          <a:bodyPr/>
+          <a:lstStyle/>
+          <a:p>
+            <a:endParaRPr lang="de-DE"/>
+          </a:p>
+        </p:txBody>
+      </p:sp>
+      <p:sp>
+        <p:nvSpPr>
+          <p:cNvPr id="4" name="Foliennummernplatzhalter 3"/>
+          <p:cNvSpPr>
+            <a:spLocks noGrp="1"/>
+          </p:cNvSpPr>
+          <p:nvPr>
+            <p:ph type="sldNum" sz="quarter" idx="5"/>
+          </p:nvPr>
+        </p:nvSpPr>
+        <p:spPr/>
+        <p:txBody>
+          <a:bodyPr/>
+          <a:lstStyle/>
+          <a:p>
+            <a:fld id="{AD1D79F6-C8AD-5749-9DE6-19634A2965BA}" type="slidenum">
+              <a:rPr lang="en-US" smtClean="0"/>
+              <a:t>4</a:t>
+            </a:fld>
+            <a:endParaRPr lang="en-US"/>
+          </a:p>
+        </p:txBody>
+      </p:sp>
+    </p:spTree>
+    <p:extLst>
+      <p:ext uri="{BB962C8B-B14F-4D97-AF65-F5344CB8AC3E}">
+        <p14:creationId xmlns:p14="http://schemas.microsoft.com/office/powerpoint/2010/main" val="1453521434"/>
+      </p:ext>
+    </p:extLst>
+  </p:cSld>
+  <p:clrMapOvr>
+    <a:masterClrMapping/>
+  </p:clrMapOvr>
+</p:notes>
+</file>
+
+<file path=ppt/notesSlides/notesSlide5.xml><?xml version="1.0" encoding="utf-8"?>
+<p:notes xmlns:a="http://schemas.openxmlformats.org/drawingml/2006/main" xmlns:r="http://schemas.openxmlformats.org/officeDocument/2006/relationships" xmlns:p="http://schemas.openxmlformats.org/presentationml/2006/main">
+  <p:cSld>
+    <p:spTree>
+      <p:nvGrpSpPr>
+        <p:cNvPr id="1" name=""/>
+        <p:cNvGrpSpPr/>
+        <p:nvPr/>
+      </p:nvGrpSpPr>
+      <p:grpSpPr>
+        <a:xfrm>
+          <a:off x="0" y="0"/>
+          <a:ext cx="0" cy="0"/>
+          <a:chOff x="0" y="0"/>
+          <a:chExt cx="0" cy="0"/>
+        </a:xfrm>
+      </p:grpSpPr>
+      <p:sp>
+        <p:nvSpPr>
+          <p:cNvPr id="2" name="Folienbildplatzhalter 1"/>
+          <p:cNvSpPr>
+            <a:spLocks noGrp="1" noRot="1" noChangeAspect="1"/>
+          </p:cNvSpPr>
+          <p:nvPr>
+            <p:ph type="sldImg"/>
+          </p:nvPr>
+        </p:nvSpPr>
+        <p:spPr/>
+      </p:sp>
+      <p:sp>
+        <p:nvSpPr>
+          <p:cNvPr id="3" name="Notizenplatzhalter 2"/>
+          <p:cNvSpPr>
+            <a:spLocks noGrp="1"/>
+          </p:cNvSpPr>
+          <p:nvPr>
+            <p:ph type="body" idx="1"/>
+          </p:nvPr>
+        </p:nvSpPr>
+        <p:spPr/>
+        <p:txBody>
+          <a:bodyPr/>
+          <a:lstStyle/>
+          <a:p>
+            <a:endParaRPr lang="de-DE"/>
+          </a:p>
+        </p:txBody>
+      </p:sp>
+      <p:sp>
+        <p:nvSpPr>
+          <p:cNvPr id="4" name="Foliennummernplatzhalter 3"/>
+          <p:cNvSpPr>
+            <a:spLocks noGrp="1"/>
+          </p:cNvSpPr>
+          <p:nvPr>
+            <p:ph type="sldNum" sz="quarter" idx="5"/>
+          </p:nvPr>
+        </p:nvSpPr>
+        <p:spPr/>
+        <p:txBody>
+          <a:bodyPr/>
+          <a:lstStyle/>
+          <a:p>
+            <a:fld id="{AD1D79F6-C8AD-5749-9DE6-19634A2965BA}" type="slidenum">
+              <a:rPr lang="en-US" smtClean="0"/>
+              <a:t>5</a:t>
+            </a:fld>
+            <a:endParaRPr lang="en-US"/>
+          </a:p>
+        </p:txBody>
+      </p:sp>
+    </p:spTree>
+    <p:extLst>
+      <p:ext uri="{BB962C8B-B14F-4D97-AF65-F5344CB8AC3E}">
+        <p14:creationId xmlns:p14="http://schemas.microsoft.com/office/powerpoint/2010/main" val="3039680407"/>
+      </p:ext>
+    </p:extLst>
+  </p:cSld>
+  <p:clrMapOvr>
+    <a:masterClrMapping/>
+  </p:clrMapOvr>
+</p:notes>
+</file>
+
+<file path=ppt/notesSlides/notesSlide6.xml><?xml version="1.0" encoding="utf-8"?>
+<p:notes xmlns:a="http://schemas.openxmlformats.org/drawingml/2006/main" xmlns:r="http://schemas.openxmlformats.org/officeDocument/2006/relationships" xmlns:p="http://schemas.openxmlformats.org/presentationml/2006/main">
+  <p:cSld>
+    <p:spTree>
+      <p:nvGrpSpPr>
+        <p:cNvPr id="1" name=""/>
+        <p:cNvGrpSpPr/>
+        <p:nvPr/>
+      </p:nvGrpSpPr>
+      <p:grpSpPr>
+        <a:xfrm>
+          <a:off x="0" y="0"/>
+          <a:ext cx="0" cy="0"/>
+          <a:chOff x="0" y="0"/>
+          <a:chExt cx="0" cy="0"/>
+        </a:xfrm>
+      </p:grpSpPr>
+      <p:sp>
+        <p:nvSpPr>
+          <p:cNvPr id="2" name="Folienbildplatzhalter 1"/>
+          <p:cNvSpPr>
+            <a:spLocks noGrp="1" noRot="1" noChangeAspect="1"/>
+          </p:cNvSpPr>
+          <p:nvPr>
+            <p:ph type="sldImg"/>
+          </p:nvPr>
+        </p:nvSpPr>
+        <p:spPr/>
+      </p:sp>
+      <p:sp>
+        <p:nvSpPr>
+          <p:cNvPr id="3" name="Notizenplatzhalter 2"/>
+          <p:cNvSpPr>
+            <a:spLocks noGrp="1"/>
+          </p:cNvSpPr>
+          <p:nvPr>
+            <p:ph type="body" idx="1"/>
+          </p:nvPr>
+        </p:nvSpPr>
+        <p:spPr/>
+        <p:txBody>
+          <a:bodyPr/>
+          <a:lstStyle/>
+          <a:p>
+            <a:r>
+              <a:rPr lang="de-DE"/>
+              <a:t>Do not modify the notes in this section to avoid tampering with the Poll Everywhere activity.
+More info at polleverywhere.com/support
+Was ist der Zweck der Verwendung des Serial Monitors in Arduino-Programmen?</a:t>
+            </a:r>
+          </a:p>
+          <a:p>
+            <a:r>
+              <a:rPr lang="de-DE"/>
+              <a:t>https://www.polleverywhere.com/multiple_choice_polls/HqLooxXn1odvZujj1fu2x?display_state=instructions&amp;activity_state=opened&amp;state=opened&amp;flow=Instructor&amp;onscreen=persist</a:t>
+            </a:r>
+          </a:p>
+        </p:txBody>
+      </p:sp>
+      <p:sp>
+        <p:nvSpPr>
+          <p:cNvPr id="4" name="Foliennummernplatzhalter 3"/>
+          <p:cNvSpPr>
+            <a:spLocks noGrp="1"/>
+          </p:cNvSpPr>
+          <p:nvPr>
+            <p:ph type="sldNum" sz="quarter" idx="5"/>
+          </p:nvPr>
+        </p:nvSpPr>
+        <p:spPr/>
+        <p:txBody>
+          <a:bodyPr/>
+          <a:lstStyle/>
+          <a:p>
+            <a:fld id="{AD1D79F6-C8AD-5749-9DE6-19634A2965BA}" type="slidenum">
+              <a:rPr lang="en-US" smtClean="0"/>
+              <a:t>8</a:t>
+            </a:fld>
+            <a:endParaRPr lang="en-US"/>
+          </a:p>
+        </p:txBody>
+      </p:sp>
+    </p:spTree>
+    <p:extLst>
+      <p:ext uri="{BB962C8B-B14F-4D97-AF65-F5344CB8AC3E}">
+        <p14:creationId xmlns:p14="http://schemas.microsoft.com/office/powerpoint/2010/main" val="3824400629"/>
+      </p:ext>
+    </p:extLst>
+  </p:cSld>
+  <p:clrMapOvr>
+    <a:masterClrMapping/>
+  </p:clrMapOvr>
+</p:notes>
+</file>
+
+<file path=ppt/notesSlides/notesSlide7.xml><?xml version="1.0" encoding="utf-8"?>
+<p:notes xmlns:a="http://schemas.openxmlformats.org/drawingml/2006/main" xmlns:r="http://schemas.openxmlformats.org/officeDocument/2006/relationships" xmlns:p="http://schemas.openxmlformats.org/presentationml/2006/main">
+  <p:cSld>
+    <p:spTree>
+      <p:nvGrpSpPr>
+        <p:cNvPr id="1" name=""/>
+        <p:cNvGrpSpPr/>
+        <p:nvPr/>
+      </p:nvGrpSpPr>
+      <p:grpSpPr>
+        <a:xfrm>
+          <a:off x="0" y="0"/>
+          <a:ext cx="0" cy="0"/>
+          <a:chOff x="0" y="0"/>
+          <a:chExt cx="0" cy="0"/>
+        </a:xfrm>
+      </p:grpSpPr>
+      <p:sp>
+        <p:nvSpPr>
+          <p:cNvPr id="2" name="Folienbildplatzhalter 1"/>
+          <p:cNvSpPr>
+            <a:spLocks noGrp="1" noRot="1" noChangeAspect="1"/>
+          </p:cNvSpPr>
+          <p:nvPr>
+            <p:ph type="sldImg"/>
+          </p:nvPr>
+        </p:nvSpPr>
+        <p:spPr/>
+      </p:sp>
+      <p:sp>
+        <p:nvSpPr>
+          <p:cNvPr id="3" name="Notizenplatzhalter 2"/>
+          <p:cNvSpPr>
+            <a:spLocks noGrp="1"/>
+          </p:cNvSpPr>
+          <p:nvPr>
+            <p:ph type="body" idx="1"/>
+          </p:nvPr>
+        </p:nvSpPr>
+        <p:spPr/>
+        <p:txBody>
+          <a:bodyPr/>
+          <a:lstStyle/>
+          <a:p>
+            <a:r>
+              <a:rPr lang="de-DE"/>
+              <a:t>Do not modify the notes in this section to avoid tampering with the Poll Everywhere activity.
+More info at polleverywhere.com/support
+Was ist der Zweck der Verwendung des Serial Monitors in Arduino-Programmen?</a:t>
+            </a:r>
+          </a:p>
+          <a:p>
+            <a:r>
+              <a:rPr lang="de-DE"/>
+              <a:t>https://www.polleverywhere.com/multiple_choice_polls/HqLooxXn1odvZujj1fu2x?display_state=chart&amp;activity_state=closed&amp;state=closed&amp;flow=Instructor&amp;onscreen=persist</a:t>
+            </a:r>
+          </a:p>
+        </p:txBody>
+      </p:sp>
+      <p:sp>
+        <p:nvSpPr>
+          <p:cNvPr id="4" name="Foliennummernplatzhalter 3"/>
+          <p:cNvSpPr>
+            <a:spLocks noGrp="1"/>
+          </p:cNvSpPr>
+          <p:nvPr>
+            <p:ph type="sldNum" sz="quarter" idx="5"/>
+          </p:nvPr>
+        </p:nvSpPr>
+        <p:spPr/>
+        <p:txBody>
+          <a:bodyPr/>
+          <a:lstStyle/>
+          <a:p>
+            <a:fld id="{AD1D79F6-C8AD-5749-9DE6-19634A2965BA}" type="slidenum">
+              <a:rPr lang="en-US" smtClean="0"/>
+              <a:t>9</a:t>
+            </a:fld>
+            <a:endParaRPr lang="en-US"/>
+          </a:p>
+        </p:txBody>
+      </p:sp>
+    </p:spTree>
+    <p:extLst>
+      <p:ext uri="{BB962C8B-B14F-4D97-AF65-F5344CB8AC3E}">
+        <p14:creationId xmlns:p14="http://schemas.microsoft.com/office/powerpoint/2010/main" val="1540821262"/>
+      </p:ext>
+    </p:extLst>
+  </p:cSld>
+  <p:clrMapOvr>
+    <a:masterClrMapping/>
+  </p:clrMapOvr>
+</p:notes>
+</file>
+
+<file path=ppt/notesSlides/notesSlide8.xml><?xml version="1.0" encoding="utf-8"?>
+<p:notes xmlns:a="http://schemas.openxmlformats.org/drawingml/2006/main" xmlns:r="http://schemas.openxmlformats.org/officeDocument/2006/relationships" xmlns:p="http://schemas.openxmlformats.org/presentationml/2006/main">
+  <p:cSld>
+    <p:spTree>
+      <p:nvGrpSpPr>
+        <p:cNvPr id="1" name=""/>
+        <p:cNvGrpSpPr/>
+        <p:nvPr/>
+      </p:nvGrpSpPr>
+      <p:grpSpPr>
+        <a:xfrm>
+          <a:off x="0" y="0"/>
+          <a:ext cx="0" cy="0"/>
+          <a:chOff x="0" y="0"/>
+          <a:chExt cx="0" cy="0"/>
+        </a:xfrm>
+      </p:grpSpPr>
+      <p:sp>
+        <p:nvSpPr>
+          <p:cNvPr id="2" name="Folienbildplatzhalter 1"/>
+          <p:cNvSpPr>
+            <a:spLocks noGrp="1" noRot="1" noChangeAspect="1"/>
+          </p:cNvSpPr>
+          <p:nvPr>
+            <p:ph type="sldImg"/>
+          </p:nvPr>
+        </p:nvSpPr>
+        <p:spPr/>
+      </p:sp>
+      <p:sp>
+        <p:nvSpPr>
+          <p:cNvPr id="3" name="Notizenplatzhalter 2"/>
+          <p:cNvSpPr>
+            <a:spLocks noGrp="1"/>
+          </p:cNvSpPr>
+          <p:nvPr>
+            <p:ph type="body" idx="1"/>
+          </p:nvPr>
+        </p:nvSpPr>
+        <p:spPr/>
+        <p:txBody>
+          <a:bodyPr/>
+          <a:lstStyle/>
+          <a:p>
+            <a:r>
+              <a:rPr lang="de-DE"/>
+              <a:t>Do not modify the notes in this section to avoid tampering with the Poll Everywhere activity.
+More info at polleverywhere.com/support
+Was ist der Zweck der Verwendung des Serial Monitors in Arduino-Programmen?</a:t>
+            </a:r>
+          </a:p>
+          <a:p>
+            <a:r>
+              <a:rPr lang="de-DE"/>
+              <a:t>https://www.polleverywhere.com/multiple_choice_polls/HqLooxXn1odvZujj1fu2x?display_state=chart&amp;activity_state=closed&amp;display=correctness&amp;state=closed&amp;flow=Instructor&amp;onscreen=persist</a:t>
+            </a:r>
+          </a:p>
+        </p:txBody>
+      </p:sp>
+      <p:sp>
+        <p:nvSpPr>
+          <p:cNvPr id="4" name="Foliennummernplatzhalter 3"/>
+          <p:cNvSpPr>
+            <a:spLocks noGrp="1"/>
+          </p:cNvSpPr>
+          <p:nvPr>
+            <p:ph type="sldNum" sz="quarter" idx="5"/>
+          </p:nvPr>
+        </p:nvSpPr>
+        <p:spPr/>
+        <p:txBody>
+          <a:bodyPr/>
+          <a:lstStyle/>
+          <a:p>
+            <a:fld id="{AD1D79F6-C8AD-5749-9DE6-19634A2965BA}" type="slidenum">
+              <a:rPr lang="en-US" smtClean="0"/>
+              <a:t>10</a:t>
+            </a:fld>
+            <a:endParaRPr lang="en-US"/>
+          </a:p>
+        </p:txBody>
+      </p:sp>
+    </p:spTree>
+    <p:extLst>
+      <p:ext uri="{BB962C8B-B14F-4D97-AF65-F5344CB8AC3E}">
+        <p14:creationId xmlns:p14="http://schemas.microsoft.com/office/powerpoint/2010/main" val="1302307840"/>
+      </p:ext>
+    </p:extLst>
+  </p:cSld>
+  <p:clrMapOvr>
+    <a:masterClrMapping/>
+  </p:clrMapOvr>
+</p:notes>
+</file>
+
+<file path=ppt/notesSlides/notesSlide9.xml><?xml version="1.0" encoding="utf-8"?>
+<p:notes xmlns:a="http://schemas.openxmlformats.org/drawingml/2006/main" xmlns:r="http://schemas.openxmlformats.org/officeDocument/2006/relationships" xmlns:p="http://schemas.openxmlformats.org/presentationml/2006/main">
+  <p:cSld>
+    <p:spTree>
+      <p:nvGrpSpPr>
+        <p:cNvPr id="1" name=""/>
+        <p:cNvGrpSpPr/>
+        <p:nvPr/>
+      </p:nvGrpSpPr>
+      <p:grpSpPr>
+        <a:xfrm>
+          <a:off x="0" y="0"/>
+          <a:ext cx="0" cy="0"/>
+          <a:chOff x="0" y="0"/>
+          <a:chExt cx="0" cy="0"/>
+        </a:xfrm>
+      </p:grpSpPr>
+      <p:sp>
+        <p:nvSpPr>
+          <p:cNvPr id="2" name="Folienbildplatzhalter 1"/>
+          <p:cNvSpPr>
+            <a:spLocks noGrp="1" noRot="1" noChangeAspect="1"/>
+          </p:cNvSpPr>
+          <p:nvPr>
+            <p:ph type="sldImg"/>
+          </p:nvPr>
+        </p:nvSpPr>
+        <p:spPr/>
+      </p:sp>
+      <p:sp>
+        <p:nvSpPr>
+          <p:cNvPr id="3" name="Notizenplatzhalter 2"/>
+          <p:cNvSpPr>
+            <a:spLocks noGrp="1"/>
+          </p:cNvSpPr>
+          <p:nvPr>
+            <p:ph type="body" idx="1"/>
+          </p:nvPr>
+        </p:nvSpPr>
+        <p:spPr/>
+        <p:txBody>
+          <a:bodyPr/>
+          <a:lstStyle/>
+          <a:p>
+            <a:endParaRPr lang="de-DE"/>
+          </a:p>
+        </p:txBody>
+      </p:sp>
+      <p:sp>
+        <p:nvSpPr>
+          <p:cNvPr id="4" name="Foliennummernplatzhalter 3"/>
+          <p:cNvSpPr>
+            <a:spLocks noGrp="1"/>
+          </p:cNvSpPr>
+          <p:nvPr>
+            <p:ph type="sldNum" sz="quarter" idx="5"/>
+          </p:nvPr>
+        </p:nvSpPr>
+        <p:spPr/>
+        <p:txBody>
+          <a:bodyPr/>
+          <a:lstStyle/>
+          <a:p>
+            <a:fld id="{AD1D79F6-C8AD-5749-9DE6-19634A2965BA}" type="slidenum">
+              <a:rPr lang="en-US" smtClean="0"/>
+              <a:t>11</a:t>
+            </a:fld>
+            <a:endParaRPr lang="en-US"/>
+          </a:p>
+        </p:txBody>
+      </p:sp>
+    </p:spTree>
+    <p:extLst>
+      <p:ext uri="{BB962C8B-B14F-4D97-AF65-F5344CB8AC3E}">
+        <p14:creationId xmlns:p14="http://schemas.microsoft.com/office/powerpoint/2010/main" val="1520880587"/>
+      </p:ext>
+    </p:extLst>
+  </p:cSld>
+  <p:clrMapOvr>
+    <a:masterClrMapping/>
+  </p:clrMapOvr>
+</p:notes>
+</file>
+
 <file path=ppt/slideLayouts/slideLayout1.xml><?xml version="1.0" encoding="utf-8"?>
 <p:sldLayout xmlns:a="http://schemas.openxmlformats.org/drawingml/2006/main" xmlns:r="http://schemas.openxmlformats.org/officeDocument/2006/relationships" xmlns:p="http://schemas.openxmlformats.org/presentationml/2006/main" type="title" preserve="1">
   <p:cSld name="Title Slide">
@@ -1153,7 +2029,7 @@
           <a:p>
             <a:fld id="{46878720-212C-42BB-B356-99628BFE1EBF}" type="datetimeFigureOut">
               <a:rPr lang="en-US" smtClean="0"/>
-              <a:t>3/29/22</a:t>
+              <a:t>11/8/23</a:t>
             </a:fld>
             <a:endParaRPr lang="en-US"/>
           </a:p>
@@ -1351,7 +2227,7 @@
           <a:p>
             <a:fld id="{46878720-212C-42BB-B356-99628BFE1EBF}" type="datetimeFigureOut">
               <a:rPr lang="en-US" smtClean="0"/>
-              <a:t>3/29/22</a:t>
+              <a:t>11/8/23</a:t>
             </a:fld>
             <a:endParaRPr lang="en-US"/>
           </a:p>
@@ -1559,7 +2435,7 @@
           <a:p>
             <a:fld id="{46878720-212C-42BB-B356-99628BFE1EBF}" type="datetimeFigureOut">
               <a:rPr lang="en-US" smtClean="0"/>
-              <a:t>3/29/22</a:t>
+              <a:t>11/8/23</a:t>
             </a:fld>
             <a:endParaRPr lang="en-US"/>
           </a:p>
@@ -1757,7 +2633,7 @@
           <a:p>
             <a:fld id="{46878720-212C-42BB-B356-99628BFE1EBF}" type="datetimeFigureOut">
               <a:rPr lang="en-US" smtClean="0"/>
-              <a:t>3/29/22</a:t>
+              <a:t>11/8/23</a:t>
             </a:fld>
             <a:endParaRPr lang="en-US"/>
           </a:p>
@@ -2032,7 +2908,7 @@
           <a:p>
             <a:fld id="{46878720-212C-42BB-B356-99628BFE1EBF}" type="datetimeFigureOut">
               <a:rPr lang="en-US" smtClean="0"/>
-              <a:t>3/29/22</a:t>
+              <a:t>11/8/23</a:t>
             </a:fld>
             <a:endParaRPr lang="en-US"/>
           </a:p>
@@ -2297,7 +3173,7 @@
           <a:p>
             <a:fld id="{46878720-212C-42BB-B356-99628BFE1EBF}" type="datetimeFigureOut">
               <a:rPr lang="en-US" smtClean="0"/>
-              <a:t>3/29/22</a:t>
+              <a:t>11/8/23</a:t>
             </a:fld>
             <a:endParaRPr lang="en-US"/>
           </a:p>
@@ -2709,7 +3585,7 @@
           <a:p>
             <a:fld id="{46878720-212C-42BB-B356-99628BFE1EBF}" type="datetimeFigureOut">
               <a:rPr lang="en-US" smtClean="0"/>
-              <a:t>3/29/22</a:t>
+              <a:t>11/8/23</a:t>
             </a:fld>
             <a:endParaRPr lang="en-US"/>
           </a:p>
@@ -2850,7 +3726,7 @@
           <a:p>
             <a:fld id="{46878720-212C-42BB-B356-99628BFE1EBF}" type="datetimeFigureOut">
               <a:rPr lang="en-US" smtClean="0"/>
-              <a:t>3/29/22</a:t>
+              <a:t>11/8/23</a:t>
             </a:fld>
             <a:endParaRPr lang="en-US"/>
           </a:p>
@@ -2963,7 +3839,7 @@
           <a:p>
             <a:fld id="{46878720-212C-42BB-B356-99628BFE1EBF}" type="datetimeFigureOut">
               <a:rPr lang="en-US" smtClean="0"/>
-              <a:t>3/29/22</a:t>
+              <a:t>11/8/23</a:t>
             </a:fld>
             <a:endParaRPr lang="en-US"/>
           </a:p>
@@ -3274,7 +4150,7 @@
           <a:p>
             <a:fld id="{46878720-212C-42BB-B356-99628BFE1EBF}" type="datetimeFigureOut">
               <a:rPr lang="en-US" smtClean="0"/>
-              <a:t>3/29/22</a:t>
+              <a:t>11/8/23</a:t>
             </a:fld>
             <a:endParaRPr lang="en-US"/>
           </a:p>
@@ -3562,7 +4438,7 @@
           <a:p>
             <a:fld id="{46878720-212C-42BB-B356-99628BFE1EBF}" type="datetimeFigureOut">
               <a:rPr lang="en-US" smtClean="0"/>
-              <a:t>3/29/22</a:t>
+              <a:t>11/8/23</a:t>
             </a:fld>
             <a:endParaRPr lang="en-US"/>
           </a:p>
@@ -3803,7 +4679,7 @@
           <a:p>
             <a:fld id="{46878720-212C-42BB-B356-99628BFE1EBF}" type="datetimeFigureOut">
               <a:rPr lang="en-US" smtClean="0"/>
-              <a:t>3/29/22</a:t>
+              <a:t>11/8/23</a:t>
             </a:fld>
             <a:endParaRPr lang="en-US"/>
           </a:p>
@@ -4696,6 +5572,298 @@
           <p:cNvPr id="2" name="Titel 1">
             <a:extLst>
               <a:ext uri="{FF2B5EF4-FFF2-40B4-BE49-F238E27FC236}">
+                <a16:creationId xmlns:a16="http://schemas.microsoft.com/office/drawing/2014/main" id="{8A41ACA6-12BA-EDFD-2A0A-AE7FF664BA0F}"/>
+              </a:ext>
+            </a:extLst>
+          </p:cNvPr>
+          <p:cNvSpPr>
+            <a:spLocks noGrp="1"/>
+          </p:cNvSpPr>
+          <p:nvPr>
+            <p:ph type="ctrTitle"/>
+          </p:nvPr>
+        </p:nvSpPr>
+        <p:spPr/>
+        <p:txBody>
+          <a:bodyPr/>
+          <a:lstStyle/>
+          <a:p>
+            <a:endParaRPr lang="de-DE"/>
+          </a:p>
+        </p:txBody>
+      </p:sp>
+      <p:sp>
+        <p:nvSpPr>
+          <p:cNvPr id="3" name="Untertitel 2">
+            <a:extLst>
+              <a:ext uri="{FF2B5EF4-FFF2-40B4-BE49-F238E27FC236}">
+                <a16:creationId xmlns:a16="http://schemas.microsoft.com/office/drawing/2014/main" id="{62C40AF6-E1AD-D236-04C8-8CD3F7D52CA9}"/>
+              </a:ext>
+            </a:extLst>
+          </p:cNvPr>
+          <p:cNvSpPr>
+            <a:spLocks noGrp="1"/>
+          </p:cNvSpPr>
+          <p:nvPr>
+            <p:ph type="subTitle" idx="1"/>
+          </p:nvPr>
+        </p:nvSpPr>
+        <p:spPr/>
+        <p:txBody>
+          <a:bodyPr/>
+          <a:lstStyle/>
+          <a:p>
+            <a:endParaRPr lang="de-DE"/>
+          </a:p>
+        </p:txBody>
+      </p:sp>
+      <p:pic>
+        <p:nvPicPr>
+          <p:cNvPr id="5" name="slide.url=https://www.polleverywhere.com/multiple_choice_polls/HqLooxXn1odvZujj1fu2x?display_state=chart&amp;activity_state=closed&amp;display=correctness&amp;state=closed&amp;flow=Instructor&amp;onscreen=persist">
+            <a:extLst>
+              <a:ext uri="{FF2B5EF4-FFF2-40B4-BE49-F238E27FC236}">
+                <a16:creationId xmlns:a16="http://schemas.microsoft.com/office/drawing/2014/main" id="{3AE92289-7B32-E391-0C3D-2245471A621C}"/>
+              </a:ext>
+            </a:extLst>
+          </p:cNvPr>
+          <p:cNvPicPr>
+            <a:picLocks/>
+          </p:cNvPicPr>
+          <p:nvPr/>
+        </p:nvPicPr>
+        <p:blipFill>
+          <a:blip r:embed="rId3">
+            <a:extLst>
+              <a:ext uri="{28A0092B-C50C-407E-A947-70E740481C1C}">
+                <a14:useLocalDpi xmlns:a14="http://schemas.microsoft.com/office/drawing/2010/main" val="0"/>
+              </a:ext>
+            </a:extLst>
+          </a:blip>
+          <a:stretch>
+            <a:fillRect/>
+          </a:stretch>
+        </p:blipFill>
+        <p:spPr>
+          <a:xfrm>
+            <a:off x="63500" y="63500"/>
+            <a:ext cx="12065000" cy="6731000"/>
+          </a:xfrm>
+          <a:prstGeom prst="rect">
+            <a:avLst/>
+          </a:prstGeom>
+        </p:spPr>
+      </p:pic>
+    </p:spTree>
+    <p:extLst>
+      <p:ext uri="{BB962C8B-B14F-4D97-AF65-F5344CB8AC3E}">
+        <p14:creationId xmlns:p14="http://schemas.microsoft.com/office/powerpoint/2010/main" val="1483653433"/>
+      </p:ext>
+    </p:extLst>
+  </p:cSld>
+  <p:clrMapOvr>
+    <a:masterClrMapping/>
+  </p:clrMapOvr>
+</p:sld>
+</file>
+
+<file path=ppt/slides/slide11.xml><?xml version="1.0" encoding="utf-8"?>
+<p:sld xmlns:a="http://schemas.openxmlformats.org/drawingml/2006/main" xmlns:r="http://schemas.openxmlformats.org/officeDocument/2006/relationships" xmlns:p="http://schemas.openxmlformats.org/presentationml/2006/main">
+  <p:cSld>
+    <p:spTree>
+      <p:nvGrpSpPr>
+        <p:cNvPr id="1" name=""/>
+        <p:cNvGrpSpPr/>
+        <p:nvPr/>
+      </p:nvGrpSpPr>
+      <p:grpSpPr>
+        <a:xfrm>
+          <a:off x="0" y="0"/>
+          <a:ext cx="0" cy="0"/>
+          <a:chOff x="0" y="0"/>
+          <a:chExt cx="0" cy="0"/>
+        </a:xfrm>
+      </p:grpSpPr>
+      <p:sp>
+        <p:nvSpPr>
+          <p:cNvPr id="2" name="Titel 1">
+            <a:extLst>
+              <a:ext uri="{FF2B5EF4-FFF2-40B4-BE49-F238E27FC236}">
+                <a16:creationId xmlns:a16="http://schemas.microsoft.com/office/drawing/2014/main" id="{392D7D64-17FB-444B-B0FC-332B8A749537}"/>
+              </a:ext>
+            </a:extLst>
+          </p:cNvPr>
+          <p:cNvSpPr>
+            <a:spLocks noGrp="1"/>
+          </p:cNvSpPr>
+          <p:nvPr>
+            <p:ph type="title"/>
+          </p:nvPr>
+        </p:nvSpPr>
+        <p:spPr/>
+        <p:txBody>
+          <a:bodyPr/>
+          <a:lstStyle/>
+          <a:p>
+            <a:r>
+              <a:rPr lang="de-DE" dirty="0" err="1"/>
+              <a:t>Arduino</a:t>
+            </a:r>
+            <a:r>
+              <a:rPr lang="de-DE" dirty="0"/>
+              <a:t> IDE 2.0 Debugging</a:t>
+            </a:r>
+          </a:p>
+        </p:txBody>
+      </p:sp>
+      <p:sp>
+        <p:nvSpPr>
+          <p:cNvPr id="4" name="Inhaltsplatzhalter 3">
+            <a:extLst>
+              <a:ext uri="{FF2B5EF4-FFF2-40B4-BE49-F238E27FC236}">
+                <a16:creationId xmlns:a16="http://schemas.microsoft.com/office/drawing/2014/main" id="{1D6E604F-B399-C249-A541-F9EDFDF20534}"/>
+              </a:ext>
+            </a:extLst>
+          </p:cNvPr>
+          <p:cNvSpPr>
+            <a:spLocks noGrp="1"/>
+          </p:cNvSpPr>
+          <p:nvPr>
+            <p:ph idx="1"/>
+          </p:nvPr>
+        </p:nvSpPr>
+        <p:spPr/>
+        <p:txBody>
+          <a:bodyPr/>
+          <a:lstStyle/>
+          <a:p>
+            <a:r>
+              <a:rPr lang="de-DE" dirty="0">
+                <a:hlinkClick r:id="rId3"/>
+              </a:rPr>
+              <a:t>https://docs.arduino.cc/software/ide-v2/tutorials/ide-v2-debugger</a:t>
+            </a:r>
+            <a:endParaRPr lang="de-DE" dirty="0"/>
+          </a:p>
+          <a:p>
+            <a:r>
+              <a:rPr lang="de-DE" dirty="0"/>
+              <a:t>Nur mit manchen Boards unterstützt (SAMD MKR Boards wie MKR Zero)</a:t>
+            </a:r>
+          </a:p>
+        </p:txBody>
+      </p:sp>
+    </p:spTree>
+    <p:extLst>
+      <p:ext uri="{BB962C8B-B14F-4D97-AF65-F5344CB8AC3E}">
+        <p14:creationId xmlns:p14="http://schemas.microsoft.com/office/powerpoint/2010/main" val="1352385898"/>
+      </p:ext>
+    </p:extLst>
+  </p:cSld>
+  <p:clrMapOvr>
+    <a:masterClrMapping/>
+  </p:clrMapOvr>
+</p:sld>
+</file>
+
+<file path=ppt/slides/slide12.xml><?xml version="1.0" encoding="utf-8"?>
+<p:sld xmlns:a="http://schemas.openxmlformats.org/drawingml/2006/main" xmlns:r="http://schemas.openxmlformats.org/officeDocument/2006/relationships" xmlns:p="http://schemas.openxmlformats.org/presentationml/2006/main">
+  <p:cSld>
+    <p:spTree>
+      <p:nvGrpSpPr>
+        <p:cNvPr id="1" name=""/>
+        <p:cNvGrpSpPr/>
+        <p:nvPr/>
+      </p:nvGrpSpPr>
+      <p:grpSpPr>
+        <a:xfrm>
+          <a:off x="0" y="0"/>
+          <a:ext cx="0" cy="0"/>
+          <a:chOff x="0" y="0"/>
+          <a:chExt cx="0" cy="0"/>
+        </a:xfrm>
+      </p:grpSpPr>
+      <p:pic>
+        <p:nvPicPr>
+          <p:cNvPr id="1026" name="Picture 2" descr="Going between breakpoints.">
+            <a:extLst>
+              <a:ext uri="{FF2B5EF4-FFF2-40B4-BE49-F238E27FC236}">
+                <a16:creationId xmlns:a16="http://schemas.microsoft.com/office/drawing/2014/main" id="{C0B75F9A-864D-BC4E-945C-745D614047B6}"/>
+              </a:ext>
+            </a:extLst>
+          </p:cNvPr>
+          <p:cNvPicPr>
+            <a:picLocks noChangeAspect="1" noChangeArrowheads="1"/>
+          </p:cNvPicPr>
+          <p:nvPr/>
+        </p:nvPicPr>
+        <p:blipFill>
+          <a:blip r:embed="rId3">
+            <a:extLst>
+              <a:ext uri="{28A0092B-C50C-407E-A947-70E740481C1C}">
+                <a14:useLocalDpi xmlns:a14="http://schemas.microsoft.com/office/drawing/2010/main" val="0"/>
+              </a:ext>
+            </a:extLst>
+          </a:blip>
+          <a:srcRect/>
+          <a:stretch>
+            <a:fillRect/>
+          </a:stretch>
+        </p:blipFill>
+        <p:spPr bwMode="auto">
+          <a:xfrm>
+            <a:off x="1639888" y="0"/>
+            <a:ext cx="8912225" cy="6858000"/>
+          </a:xfrm>
+          <a:prstGeom prst="rect">
+            <a:avLst/>
+          </a:prstGeom>
+          <a:noFill/>
+          <a:extLst>
+            <a:ext uri="{909E8E84-426E-40DD-AFC4-6F175D3DCCD1}">
+              <a14:hiddenFill xmlns:a14="http://schemas.microsoft.com/office/drawing/2010/main">
+                <a:solidFill>
+                  <a:srgbClr val="FFFFFF"/>
+                </a:solidFill>
+              </a14:hiddenFill>
+            </a:ext>
+          </a:extLst>
+        </p:spPr>
+      </p:pic>
+    </p:spTree>
+    <p:extLst>
+      <p:ext uri="{BB962C8B-B14F-4D97-AF65-F5344CB8AC3E}">
+        <p14:creationId xmlns:p14="http://schemas.microsoft.com/office/powerpoint/2010/main" val="1029990919"/>
+      </p:ext>
+    </p:extLst>
+  </p:cSld>
+  <p:clrMapOvr>
+    <a:masterClrMapping/>
+  </p:clrMapOvr>
+</p:sld>
+</file>
+
+<file path=ppt/slides/slide13.xml><?xml version="1.0" encoding="utf-8"?>
+<p:sld xmlns:a="http://schemas.openxmlformats.org/drawingml/2006/main" xmlns:r="http://schemas.openxmlformats.org/officeDocument/2006/relationships" xmlns:p="http://schemas.openxmlformats.org/presentationml/2006/main">
+  <p:cSld>
+    <p:spTree>
+      <p:nvGrpSpPr>
+        <p:cNvPr id="1" name=""/>
+        <p:cNvGrpSpPr/>
+        <p:nvPr/>
+      </p:nvGrpSpPr>
+      <p:grpSpPr>
+        <a:xfrm>
+          <a:off x="0" y="0"/>
+          <a:ext cx="0" cy="0"/>
+          <a:chOff x="0" y="0"/>
+          <a:chExt cx="0" cy="0"/>
+        </a:xfrm>
+      </p:grpSpPr>
+      <p:sp>
+        <p:nvSpPr>
+          <p:cNvPr id="2" name="Titel 1">
+            <a:extLst>
+              <a:ext uri="{FF2B5EF4-FFF2-40B4-BE49-F238E27FC236}">
                 <a16:creationId xmlns:a16="http://schemas.microsoft.com/office/drawing/2014/main" id="{334936CD-7D3C-B341-9FFC-2AF7C2C2928F}"/>
               </a:ext>
             </a:extLst>
@@ -4785,7 +5953,7 @@
             </a:r>
             <a:r>
               <a:rPr lang="de-DE" dirty="0">
-                <a:hlinkClick r:id="rId2"/>
+                <a:hlinkClick r:id="rId3"/>
               </a:rPr>
               <a:t>https://creativecommons.org/licenses/by-sa/3.0/</a:t>
             </a:r>
@@ -4800,7 +5968,7 @@
           <a:p>
             <a:r>
               <a:rPr lang="de-DE" dirty="0">
-                <a:hlinkClick r:id="rId3"/>
+                <a:hlinkClick r:id="rId4"/>
               </a:rPr>
               <a:t>https://docs.arduino.cc/software/ide-v2/tutorials/ide-v2-debugger</a:t>
             </a:r>
@@ -5021,7 +6189,7 @@
           <p:nvPr/>
         </p:nvPicPr>
         <p:blipFill>
-          <a:blip r:embed="rId2"/>
+          <a:blip r:embed="rId3"/>
           <a:stretch>
             <a:fillRect/>
           </a:stretch>
@@ -5051,7 +6219,7 @@
           <p:nvPr/>
         </p:nvPicPr>
         <p:blipFill>
-          <a:blip r:embed="rId3"/>
+          <a:blip r:embed="rId4"/>
           <a:stretch>
             <a:fillRect/>
           </a:stretch>
@@ -5131,7 +6299,7 @@
           <p:nvPr/>
         </p:nvPicPr>
         <p:blipFill>
-          <a:blip r:embed="rId4"/>
+          <a:blip r:embed="rId5"/>
           <a:stretch>
             <a:fillRect/>
           </a:stretch>
@@ -5241,7 +6409,7 @@
           <p:nvPr/>
         </p:nvPicPr>
         <p:blipFill>
-          <a:blip r:embed="rId2"/>
+          <a:blip r:embed="rId3"/>
           <a:stretch>
             <a:fillRect/>
           </a:stretch>
@@ -5271,7 +6439,7 @@
           <p:nvPr/>
         </p:nvPicPr>
         <p:blipFill>
-          <a:blip r:embed="rId3"/>
+          <a:blip r:embed="rId4"/>
           <a:stretch>
             <a:fillRect/>
           </a:stretch>
@@ -5288,7 +6456,7 @@
       </p:pic>
       <mc:AlternateContent xmlns:mc="http://schemas.openxmlformats.org/markup-compatibility/2006" xmlns:p14="http://schemas.microsoft.com/office/powerpoint/2010/main">
         <mc:Choice Requires="p14">
-          <p:contentPart p14:bwMode="auto" r:id="rId4">
+          <p:contentPart p14:bwMode="auto" r:id="rId5">
             <p14:nvContentPartPr>
               <p14:cNvPr id="4" name="Freihand 3">
                 <a:extLst>
@@ -5320,7 +6488,7 @@
               <p:nvPr/>
             </p:nvPicPr>
             <p:blipFill>
-              <a:blip r:embed="rId5"/>
+              <a:blip r:embed="rId6"/>
               <a:stretch>
                 <a:fillRect/>
               </a:stretch>
@@ -5339,7 +6507,7 @@
       </mc:AlternateContent>
       <mc:AlternateContent xmlns:mc="http://schemas.openxmlformats.org/markup-compatibility/2006" xmlns:p14="http://schemas.microsoft.com/office/powerpoint/2010/main">
         <mc:Choice Requires="p14">
-          <p:contentPart p14:bwMode="auto" r:id="rId6">
+          <p:contentPart p14:bwMode="auto" r:id="rId7">
             <p14:nvContentPartPr>
               <p14:cNvPr id="5" name="Freihand 4">
                 <a:extLst>
@@ -5371,7 +6539,7 @@
               <p:nvPr/>
             </p:nvPicPr>
             <p:blipFill>
-              <a:blip r:embed="rId7"/>
+              <a:blip r:embed="rId8"/>
               <a:stretch>
                 <a:fillRect/>
               </a:stretch>
@@ -5530,7 +6698,7 @@
         </p:grpSpPr>
         <mc:AlternateContent xmlns:mc="http://schemas.openxmlformats.org/markup-compatibility/2006" xmlns:p14="http://schemas.microsoft.com/office/powerpoint/2010/main">
           <mc:Choice Requires="p14">
-            <p:contentPart p14:bwMode="auto" r:id="rId8">
+            <p:contentPart p14:bwMode="auto" r:id="rId9">
               <p14:nvContentPartPr>
                 <p14:cNvPr id="10" name="Freihand 9">
                   <a:extLst>
@@ -5562,7 +6730,7 @@
                 <p:nvPr/>
               </p:nvPicPr>
               <p:blipFill>
-                <a:blip r:embed="rId9"/>
+                <a:blip r:embed="rId10"/>
                 <a:stretch>
                   <a:fillRect/>
                 </a:stretch>
@@ -5581,7 +6749,7 @@
         </mc:AlternateContent>
         <mc:AlternateContent xmlns:mc="http://schemas.openxmlformats.org/markup-compatibility/2006" xmlns:p14="http://schemas.microsoft.com/office/powerpoint/2010/main">
           <mc:Choice Requires="p14">
-            <p:contentPart p14:bwMode="auto" r:id="rId10">
+            <p:contentPart p14:bwMode="auto" r:id="rId11">
               <p14:nvContentPartPr>
                 <p14:cNvPr id="11" name="Freihand 10">
                   <a:extLst>
@@ -5613,7 +6781,7 @@
                 <p:nvPr/>
               </p:nvPicPr>
               <p:blipFill>
-                <a:blip r:embed="rId11"/>
+                <a:blip r:embed="rId12"/>
                 <a:stretch>
                   <a:fillRect/>
                 </a:stretch>
@@ -5632,7 +6800,7 @@
         </mc:AlternateContent>
         <mc:AlternateContent xmlns:mc="http://schemas.openxmlformats.org/markup-compatibility/2006" xmlns:p14="http://schemas.microsoft.com/office/powerpoint/2010/main">
           <mc:Choice Requires="p14">
-            <p:contentPart p14:bwMode="auto" r:id="rId12">
+            <p:contentPart p14:bwMode="auto" r:id="rId13">
               <p14:nvContentPartPr>
                 <p14:cNvPr id="13" name="Freihand 12">
                   <a:extLst>
@@ -5664,7 +6832,7 @@
                 <p:nvPr/>
               </p:nvPicPr>
               <p:blipFill>
-                <a:blip r:embed="rId13"/>
+                <a:blip r:embed="rId14"/>
                 <a:stretch>
                   <a:fillRect/>
                 </a:stretch>
@@ -5704,7 +6872,7 @@
         </p:grpSpPr>
         <mc:AlternateContent xmlns:mc="http://schemas.openxmlformats.org/markup-compatibility/2006" xmlns:p14="http://schemas.microsoft.com/office/powerpoint/2010/main">
           <mc:Choice Requires="p14">
-            <p:contentPart p14:bwMode="auto" r:id="rId14">
+            <p:contentPart p14:bwMode="auto" r:id="rId15">
               <p14:nvContentPartPr>
                 <p14:cNvPr id="15" name="Freihand 14">
                   <a:extLst>
@@ -5736,7 +6904,7 @@
                 <p:nvPr/>
               </p:nvPicPr>
               <p:blipFill>
-                <a:blip r:embed="rId15"/>
+                <a:blip r:embed="rId16"/>
                 <a:stretch>
                   <a:fillRect/>
                 </a:stretch>
@@ -5755,7 +6923,7 @@
         </mc:AlternateContent>
         <mc:AlternateContent xmlns:mc="http://schemas.openxmlformats.org/markup-compatibility/2006" xmlns:p14="http://schemas.microsoft.com/office/powerpoint/2010/main">
           <mc:Choice Requires="p14">
-            <p:contentPart p14:bwMode="auto" r:id="rId16">
+            <p:contentPart p14:bwMode="auto" r:id="rId17">
               <p14:nvContentPartPr>
                 <p14:cNvPr id="16" name="Freihand 15">
                   <a:extLst>
@@ -5787,7 +6955,7 @@
                 <p:nvPr/>
               </p:nvPicPr>
               <p:blipFill>
-                <a:blip r:embed="rId17"/>
+                <a:blip r:embed="rId18"/>
                 <a:stretch>
                   <a:fillRect/>
                 </a:stretch>
@@ -5807,7 +6975,7 @@
       </p:grpSp>
       <mc:AlternateContent xmlns:mc="http://schemas.openxmlformats.org/markup-compatibility/2006" xmlns:p14="http://schemas.microsoft.com/office/powerpoint/2010/main">
         <mc:Choice Requires="p14">
-          <p:contentPart p14:bwMode="auto" r:id="rId18">
+          <p:contentPart p14:bwMode="auto" r:id="rId19">
             <p14:nvContentPartPr>
               <p14:cNvPr id="18" name="Freihand 17">
                 <a:extLst>
@@ -5839,7 +7007,7 @@
               <p:nvPr/>
             </p:nvPicPr>
             <p:blipFill>
-              <a:blip r:embed="rId19"/>
+              <a:blip r:embed="rId20"/>
               <a:stretch>
                 <a:fillRect/>
               </a:stretch>
@@ -5878,7 +7046,7 @@
         </p:grpSpPr>
         <mc:AlternateContent xmlns:mc="http://schemas.openxmlformats.org/markup-compatibility/2006" xmlns:p14="http://schemas.microsoft.com/office/powerpoint/2010/main">
           <mc:Choice Requires="p14">
-            <p:contentPart p14:bwMode="auto" r:id="rId20">
+            <p:contentPart p14:bwMode="auto" r:id="rId21">
               <p14:nvContentPartPr>
                 <p14:cNvPr id="19" name="Freihand 18">
                   <a:extLst>
@@ -5910,7 +7078,7 @@
                 <p:nvPr/>
               </p:nvPicPr>
               <p:blipFill>
-                <a:blip r:embed="rId21"/>
+                <a:blip r:embed="rId22"/>
                 <a:stretch>
                   <a:fillRect/>
                 </a:stretch>
@@ -5929,7 +7097,7 @@
         </mc:AlternateContent>
         <mc:AlternateContent xmlns:mc="http://schemas.openxmlformats.org/markup-compatibility/2006" xmlns:p14="http://schemas.microsoft.com/office/powerpoint/2010/main">
           <mc:Choice Requires="p14">
-            <p:contentPart p14:bwMode="auto" r:id="rId22">
+            <p:contentPart p14:bwMode="auto" r:id="rId23">
               <p14:nvContentPartPr>
                 <p14:cNvPr id="20" name="Freihand 19">
                   <a:extLst>
@@ -5961,7 +7129,7 @@
                 <p:nvPr/>
               </p:nvPicPr>
               <p:blipFill>
-                <a:blip r:embed="rId23"/>
+                <a:blip r:embed="rId24"/>
                 <a:stretch>
                   <a:fillRect/>
                 </a:stretch>
@@ -5980,7 +7148,7 @@
         </mc:AlternateContent>
         <mc:AlternateContent xmlns:mc="http://schemas.openxmlformats.org/markup-compatibility/2006" xmlns:p14="http://schemas.microsoft.com/office/powerpoint/2010/main">
           <mc:Choice Requires="p14">
-            <p:contentPart p14:bwMode="auto" r:id="rId24">
+            <p:contentPart p14:bwMode="auto" r:id="rId25">
               <p14:nvContentPartPr>
                 <p14:cNvPr id="21" name="Freihand 20">
                   <a:extLst>
@@ -6012,7 +7180,7 @@
                 <p:nvPr/>
               </p:nvPicPr>
               <p:blipFill>
-                <a:blip r:embed="rId25"/>
+                <a:blip r:embed="rId26"/>
                 <a:stretch>
                   <a:fillRect/>
                 </a:stretch>
@@ -6052,7 +7220,7 @@
         </p:grpSpPr>
         <mc:AlternateContent xmlns:mc="http://schemas.openxmlformats.org/markup-compatibility/2006" xmlns:p14="http://schemas.microsoft.com/office/powerpoint/2010/main">
           <mc:Choice Requires="p14">
-            <p:contentPart p14:bwMode="auto" r:id="rId26">
+            <p:contentPart p14:bwMode="auto" r:id="rId27">
               <p14:nvContentPartPr>
                 <p14:cNvPr id="23" name="Freihand 22">
                   <a:extLst>
@@ -6084,7 +7252,7 @@
                 <p:nvPr/>
               </p:nvPicPr>
               <p:blipFill>
-                <a:blip r:embed="rId27"/>
+                <a:blip r:embed="rId28"/>
                 <a:stretch>
                   <a:fillRect/>
                 </a:stretch>
@@ -6103,7 +7271,7 @@
         </mc:AlternateContent>
         <mc:AlternateContent xmlns:mc="http://schemas.openxmlformats.org/markup-compatibility/2006" xmlns:p14="http://schemas.microsoft.com/office/powerpoint/2010/main">
           <mc:Choice Requires="p14">
-            <p:contentPart p14:bwMode="auto" r:id="rId28">
+            <p:contentPart p14:bwMode="auto" r:id="rId29">
               <p14:nvContentPartPr>
                 <p14:cNvPr id="24" name="Freihand 23">
                   <a:extLst>
@@ -6135,7 +7303,7 @@
                 <p:nvPr/>
               </p:nvPicPr>
               <p:blipFill>
-                <a:blip r:embed="rId29"/>
+                <a:blip r:embed="rId30"/>
                 <a:stretch>
                   <a:fillRect/>
                 </a:stretch>
@@ -6154,7 +7322,7 @@
         </mc:AlternateContent>
         <mc:AlternateContent xmlns:mc="http://schemas.openxmlformats.org/markup-compatibility/2006" xmlns:p14="http://schemas.microsoft.com/office/powerpoint/2010/main">
           <mc:Choice Requires="p14">
-            <p:contentPart p14:bwMode="auto" r:id="rId30">
+            <p:contentPart p14:bwMode="auto" r:id="rId31">
               <p14:nvContentPartPr>
                 <p14:cNvPr id="25" name="Freihand 24">
                   <a:extLst>
@@ -6186,7 +7354,7 @@
                 <p:nvPr/>
               </p:nvPicPr>
               <p:blipFill>
-                <a:blip r:embed="rId31"/>
+                <a:blip r:embed="rId32"/>
                 <a:stretch>
                   <a:fillRect/>
                 </a:stretch>
@@ -6219,7 +7387,7 @@
           <p:nvPr/>
         </p:nvPicPr>
         <p:blipFill>
-          <a:blip r:embed="rId32"/>
+          <a:blip r:embed="rId33"/>
           <a:stretch>
             <a:fillRect/>
           </a:stretch>
@@ -6341,7 +7509,7 @@
         </p:grpSpPr>
         <mc:AlternateContent xmlns:mc="http://schemas.openxmlformats.org/markup-compatibility/2006" xmlns:p14="http://schemas.microsoft.com/office/powerpoint/2010/main">
           <mc:Choice Requires="p14">
-            <p:contentPart p14:bwMode="auto" r:id="rId33">
+            <p:contentPart p14:bwMode="auto" r:id="rId34">
               <p14:nvContentPartPr>
                 <p14:cNvPr id="30" name="Freihand 29">
                   <a:extLst>
@@ -6373,7 +7541,7 @@
                 <p:nvPr/>
               </p:nvPicPr>
               <p:blipFill>
-                <a:blip r:embed="rId34"/>
+                <a:blip r:embed="rId35"/>
                 <a:stretch>
                   <a:fillRect/>
                 </a:stretch>
@@ -6392,7 +7560,7 @@
         </mc:AlternateContent>
         <mc:AlternateContent xmlns:mc="http://schemas.openxmlformats.org/markup-compatibility/2006" xmlns:p14="http://schemas.microsoft.com/office/powerpoint/2010/main">
           <mc:Choice Requires="p14">
-            <p:contentPart p14:bwMode="auto" r:id="rId35">
+            <p:contentPart p14:bwMode="auto" r:id="rId36">
               <p14:nvContentPartPr>
                 <p14:cNvPr id="31" name="Freihand 30">
                   <a:extLst>
@@ -6424,7 +7592,7 @@
                 <p:nvPr/>
               </p:nvPicPr>
               <p:blipFill>
-                <a:blip r:embed="rId36"/>
+                <a:blip r:embed="rId37"/>
                 <a:stretch>
                   <a:fillRect/>
                 </a:stretch>
@@ -6515,7 +7683,7 @@
           <p:nvPr/>
         </p:nvPicPr>
         <p:blipFill>
-          <a:blip r:embed="rId2"/>
+          <a:blip r:embed="rId3"/>
           <a:stretch>
             <a:fillRect/>
           </a:stretch>
@@ -6559,79 +7727,79 @@
           <a:p>
             <a:r>
               <a:rPr lang="de-DE" dirty="0">
-                <a:hlinkClick r:id="rId3"/>
+                <a:hlinkClick r:id="rId4"/>
               </a:rPr>
               <a:t>https://</a:t>
             </a:r>
             <a:r>
               <a:rPr lang="de-DE" dirty="0" err="1">
-                <a:hlinkClick r:id="rId3"/>
+                <a:hlinkClick r:id="rId4"/>
               </a:rPr>
               <a:t>www.arduino.cc</a:t>
             </a:r>
             <a:r>
               <a:rPr lang="de-DE" dirty="0">
-                <a:hlinkClick r:id="rId3"/>
+                <a:hlinkClick r:id="rId4"/>
               </a:rPr>
               <a:t>/</a:t>
             </a:r>
             <a:r>
               <a:rPr lang="de-DE" dirty="0" err="1">
-                <a:hlinkClick r:id="rId3"/>
+                <a:hlinkClick r:id="rId4"/>
               </a:rPr>
               <a:t>reference</a:t>
             </a:r>
             <a:r>
               <a:rPr lang="de-DE" dirty="0">
-                <a:hlinkClick r:id="rId3"/>
+                <a:hlinkClick r:id="rId4"/>
               </a:rPr>
               <a:t>/en/</a:t>
             </a:r>
             <a:r>
               <a:rPr lang="de-DE" dirty="0" err="1">
-                <a:hlinkClick r:id="rId3"/>
+                <a:hlinkClick r:id="rId4"/>
               </a:rPr>
               <a:t>language</a:t>
             </a:r>
             <a:r>
               <a:rPr lang="de-DE" dirty="0">
-                <a:hlinkClick r:id="rId3"/>
+                <a:hlinkClick r:id="rId4"/>
               </a:rPr>
               <a:t>/</a:t>
             </a:r>
             <a:r>
               <a:rPr lang="de-DE" dirty="0" err="1">
-                <a:hlinkClick r:id="rId3"/>
+                <a:hlinkClick r:id="rId4"/>
               </a:rPr>
               <a:t>functions</a:t>
             </a:r>
             <a:r>
               <a:rPr lang="de-DE" dirty="0">
-                <a:hlinkClick r:id="rId3"/>
+                <a:hlinkClick r:id="rId4"/>
               </a:rPr>
               <a:t>/</a:t>
             </a:r>
             <a:r>
               <a:rPr lang="de-DE" dirty="0" err="1">
-                <a:hlinkClick r:id="rId3"/>
+                <a:hlinkClick r:id="rId4"/>
               </a:rPr>
               <a:t>communication</a:t>
             </a:r>
             <a:r>
               <a:rPr lang="de-DE" dirty="0">
-                <a:hlinkClick r:id="rId3"/>
+                <a:hlinkClick r:id="rId4"/>
               </a:rPr>
               <a:t>/</a:t>
             </a:r>
             <a:r>
               <a:rPr lang="de-DE" dirty="0" err="1">
-                <a:hlinkClick r:id="rId3"/>
+                <a:hlinkClick r:id="rId4"/>
               </a:rPr>
               <a:t>serial</a:t>
             </a:r>
             <a:r>
               <a:rPr lang="de-DE" dirty="0">
-                <a:hlinkClick r:id="rId3"/>
+                <a:hlinkClick r:id="rId4"/>
               </a:rPr>
               <a:t>/</a:t>
             </a:r>
@@ -7204,15 +8372,15 @@
           <p:cNvPr id="2" name="Titel 1">
             <a:extLst>
               <a:ext uri="{FF2B5EF4-FFF2-40B4-BE49-F238E27FC236}">
-                <a16:creationId xmlns:a16="http://schemas.microsoft.com/office/drawing/2014/main" id="{392D7D64-17FB-444B-B0FC-332B8A749537}"/>
-              </a:ext>
-            </a:extLst>
-          </p:cNvPr>
-          <p:cNvSpPr>
-            <a:spLocks noGrp="1"/>
-          </p:cNvSpPr>
-          <p:nvPr>
-            <p:ph type="title"/>
+                <a16:creationId xmlns:a16="http://schemas.microsoft.com/office/drawing/2014/main" id="{FBE6855B-367A-2844-324C-FD0C7A338690}"/>
+              </a:ext>
+            </a:extLst>
+          </p:cNvPr>
+          <p:cNvSpPr>
+            <a:spLocks noGrp="1"/>
+          </p:cNvSpPr>
+          <p:nvPr>
+            <p:ph type="ctrTitle"/>
           </p:nvPr>
         </p:nvSpPr>
         <p:spPr/>
@@ -7220,31 +8388,24 @@
           <a:bodyPr/>
           <a:lstStyle/>
           <a:p>
-            <a:r>
-              <a:rPr lang="de-DE" dirty="0" err="1"/>
-              <a:t>Arduino</a:t>
-            </a:r>
-            <a:r>
-              <a:rPr lang="de-DE" dirty="0"/>
-              <a:t> IDE 2.0 Debugging</a:t>
-            </a:r>
-          </a:p>
-        </p:txBody>
-      </p:sp>
-      <p:sp>
-        <p:nvSpPr>
-          <p:cNvPr id="4" name="Inhaltsplatzhalter 3">
-            <a:extLst>
-              <a:ext uri="{FF2B5EF4-FFF2-40B4-BE49-F238E27FC236}">
-                <a16:creationId xmlns:a16="http://schemas.microsoft.com/office/drawing/2014/main" id="{1D6E604F-B399-C249-A541-F9EDFDF20534}"/>
-              </a:ext>
-            </a:extLst>
-          </p:cNvPr>
-          <p:cNvSpPr>
-            <a:spLocks noGrp="1"/>
-          </p:cNvSpPr>
-          <p:nvPr>
-            <p:ph idx="1"/>
+            <a:endParaRPr lang="de-DE"/>
+          </a:p>
+        </p:txBody>
+      </p:sp>
+      <p:sp>
+        <p:nvSpPr>
+          <p:cNvPr id="3" name="Untertitel 2">
+            <a:extLst>
+              <a:ext uri="{FF2B5EF4-FFF2-40B4-BE49-F238E27FC236}">
+                <a16:creationId xmlns:a16="http://schemas.microsoft.com/office/drawing/2014/main" id="{962E9ACB-8183-AD2D-7005-ACEC72455141}"/>
+              </a:ext>
+            </a:extLst>
+          </p:cNvPr>
+          <p:cNvSpPr>
+            <a:spLocks noGrp="1"/>
+          </p:cNvSpPr>
+          <p:nvPr>
+            <p:ph type="subTitle" idx="1"/>
           </p:nvPr>
         </p:nvSpPr>
         <p:spPr/>
@@ -7252,34 +8413,50 @@
           <a:bodyPr/>
           <a:lstStyle/>
           <a:p>
-            <a:r>
-              <a:rPr lang="de-DE" dirty="0">
-                <a:hlinkClick r:id="rId2"/>
-              </a:rPr>
-              <a:t>https://docs.arduino.cc/software/ide-v2/tutorials/ide-v2-debugger</a:t>
-            </a:r>
-            <a:endParaRPr lang="de-DE" dirty="0"/>
-          </a:p>
-          <a:p>
-            <a:r>
-              <a:rPr lang="de-DE" dirty="0"/>
-              <a:t>Nur mit manchen Boards unterstützt (</a:t>
-            </a:r>
-            <a:r>
-              <a:rPr lang="de-DE"/>
-              <a:t>SAMD21 basierende </a:t>
-            </a:r>
-            <a:r>
-              <a:rPr lang="de-DE" dirty="0"/>
-              <a:t>Boards wie MKR Zero)</a:t>
-            </a:r>
-          </a:p>
-        </p:txBody>
-      </p:sp>
+            <a:endParaRPr lang="de-DE"/>
+          </a:p>
+        </p:txBody>
+      </p:sp>
+      <p:pic>
+        <p:nvPicPr>
+          <p:cNvPr id="5" name="slide.url=https://www.polleverywhere.com/multiple_choice_polls/HqLooxXn1odvZujj1fu2x?display_state=instructions&amp;activity_state=opened&amp;state=opened&amp;flow=Instructor&amp;onscreen=persist">
+            <a:extLst>
+              <a:ext uri="{FF2B5EF4-FFF2-40B4-BE49-F238E27FC236}">
+                <a16:creationId xmlns:a16="http://schemas.microsoft.com/office/drawing/2014/main" id="{30FDA193-67F9-9A57-8A19-7F64F9C6CEA5}"/>
+              </a:ext>
+            </a:extLst>
+          </p:cNvPr>
+          <p:cNvPicPr>
+            <a:picLocks/>
+          </p:cNvPicPr>
+          <p:nvPr/>
+        </p:nvPicPr>
+        <p:blipFill>
+          <a:blip r:embed="rId3">
+            <a:extLst>
+              <a:ext uri="{28A0092B-C50C-407E-A947-70E740481C1C}">
+                <a14:useLocalDpi xmlns:a14="http://schemas.microsoft.com/office/drawing/2010/main" val="0"/>
+              </a:ext>
+            </a:extLst>
+          </a:blip>
+          <a:stretch>
+            <a:fillRect/>
+          </a:stretch>
+        </p:blipFill>
+        <p:spPr>
+          <a:xfrm>
+            <a:off x="63500" y="63500"/>
+            <a:ext cx="12065000" cy="6731000"/>
+          </a:xfrm>
+          <a:prstGeom prst="rect">
+            <a:avLst/>
+          </a:prstGeom>
+        </p:spPr>
+      </p:pic>
     </p:spTree>
     <p:extLst>
       <p:ext uri="{BB962C8B-B14F-4D97-AF65-F5344CB8AC3E}">
-        <p14:creationId xmlns:p14="http://schemas.microsoft.com/office/powerpoint/2010/main" val="1352385898"/>
+        <p14:creationId xmlns:p14="http://schemas.microsoft.com/office/powerpoint/2010/main" val="1756571760"/>
       </p:ext>
     </p:extLst>
   </p:cSld>
@@ -7306,57 +8483,96 @@
           <a:chExt cx="0" cy="0"/>
         </a:xfrm>
       </p:grpSpPr>
+      <p:sp>
+        <p:nvSpPr>
+          <p:cNvPr id="2" name="Titel 1">
+            <a:extLst>
+              <a:ext uri="{FF2B5EF4-FFF2-40B4-BE49-F238E27FC236}">
+                <a16:creationId xmlns:a16="http://schemas.microsoft.com/office/drawing/2014/main" id="{B5AC8E04-AA0D-DE4A-FE17-A06407E09964}"/>
+              </a:ext>
+            </a:extLst>
+          </p:cNvPr>
+          <p:cNvSpPr>
+            <a:spLocks noGrp="1"/>
+          </p:cNvSpPr>
+          <p:nvPr>
+            <p:ph type="ctrTitle"/>
+          </p:nvPr>
+        </p:nvSpPr>
+        <p:spPr/>
+        <p:txBody>
+          <a:bodyPr/>
+          <a:lstStyle/>
+          <a:p>
+            <a:endParaRPr lang="de-DE"/>
+          </a:p>
+        </p:txBody>
+      </p:sp>
+      <p:sp>
+        <p:nvSpPr>
+          <p:cNvPr id="3" name="Untertitel 2">
+            <a:extLst>
+              <a:ext uri="{FF2B5EF4-FFF2-40B4-BE49-F238E27FC236}">
+                <a16:creationId xmlns:a16="http://schemas.microsoft.com/office/drawing/2014/main" id="{A84FFF49-228C-7880-1E7A-7C99A76A2934}"/>
+              </a:ext>
+            </a:extLst>
+          </p:cNvPr>
+          <p:cNvSpPr>
+            <a:spLocks noGrp="1"/>
+          </p:cNvSpPr>
+          <p:nvPr>
+            <p:ph type="subTitle" idx="1"/>
+          </p:nvPr>
+        </p:nvSpPr>
+        <p:spPr/>
+        <p:txBody>
+          <a:bodyPr/>
+          <a:lstStyle/>
+          <a:p>
+            <a:endParaRPr lang="de-DE"/>
+          </a:p>
+        </p:txBody>
+      </p:sp>
       <p:pic>
         <p:nvPicPr>
-          <p:cNvPr id="1026" name="Picture 2" descr="Going between breakpoints.">
-            <a:extLst>
-              <a:ext uri="{FF2B5EF4-FFF2-40B4-BE49-F238E27FC236}">
-                <a16:creationId xmlns:a16="http://schemas.microsoft.com/office/drawing/2014/main" id="{C0B75F9A-864D-BC4E-945C-745D614047B6}"/>
+          <p:cNvPr id="5" name="slide.url=https://www.polleverywhere.com/multiple_choice_polls/HqLooxXn1odvZujj1fu2x?display_state=chart&amp;activity_state=closed&amp;state=closed&amp;flow=Instructor&amp;onscreen=persist">
+            <a:extLst>
+              <a:ext uri="{FF2B5EF4-FFF2-40B4-BE49-F238E27FC236}">
+                <a16:creationId xmlns:a16="http://schemas.microsoft.com/office/drawing/2014/main" id="{65F907BD-80EB-BD1F-ABA7-3DB8C3A75464}"/>
               </a:ext>
             </a:extLst>
           </p:cNvPr>
           <p:cNvPicPr>
-            <a:picLocks noChangeAspect="1" noChangeArrowheads="1"/>
+            <a:picLocks/>
           </p:cNvPicPr>
           <p:nvPr/>
         </p:nvPicPr>
         <p:blipFill>
-          <a:blip r:embed="rId2">
+          <a:blip r:embed="rId3">
             <a:extLst>
               <a:ext uri="{28A0092B-C50C-407E-A947-70E740481C1C}">
                 <a14:useLocalDpi xmlns:a14="http://schemas.microsoft.com/office/drawing/2010/main" val="0"/>
               </a:ext>
             </a:extLst>
           </a:blip>
-          <a:srcRect/>
           <a:stretch>
             <a:fillRect/>
           </a:stretch>
         </p:blipFill>
-        <p:spPr bwMode="auto">
+        <p:spPr>
           <a:xfrm>
-            <a:off x="1639888" y="0"/>
-            <a:ext cx="8912225" cy="6858000"/>
+            <a:off x="63500" y="63500"/>
+            <a:ext cx="12065000" cy="6731000"/>
           </a:xfrm>
           <a:prstGeom prst="rect">
             <a:avLst/>
           </a:prstGeom>
-          <a:noFill/>
-          <a:extLst>
-            <a:ext uri="{909E8E84-426E-40DD-AFC4-6F175D3DCCD1}">
-              <a14:hiddenFill xmlns:a14="http://schemas.microsoft.com/office/drawing/2010/main">
-                <a:solidFill>
-                  <a:srgbClr val="FFFFFF"/>
-                </a:solidFill>
-              </a14:hiddenFill>
-            </a:ext>
-          </a:extLst>
         </p:spPr>
       </p:pic>
     </p:spTree>
     <p:extLst>
       <p:ext uri="{BB962C8B-B14F-4D97-AF65-F5344CB8AC3E}">
-        <p14:creationId xmlns:p14="http://schemas.microsoft.com/office/powerpoint/2010/main" val="1029990919"/>
+        <p14:creationId xmlns:p14="http://schemas.microsoft.com/office/powerpoint/2010/main" val="1461478577"/>
       </p:ext>
     </p:extLst>
   </p:cSld>
@@ -7957,6 +9173,12 @@
 </file>
 
 <file path=customXml/item1.xml><?xml version="1.0" encoding="utf-8"?>
+<p:properties xmlns:p="http://schemas.microsoft.com/office/2006/metadata/properties" xmlns:xsi="http://www.w3.org/2001/XMLSchema-instance" xmlns:pc="http://schemas.microsoft.com/office/infopath/2007/PartnerControls">
+  <documentManagement/>
+</p:properties>
+</file>
+
+<file path=customXml/item2.xml><?xml version="1.0" encoding="utf-8"?>
 <ct:contentTypeSchema xmlns:ct="http://schemas.microsoft.com/office/2006/metadata/contentType" xmlns:ma="http://schemas.microsoft.com/office/2006/metadata/properties/metaAttributes" ct:_="" ma:_="" ma:contentTypeName="Document" ma:contentTypeID="0x010100B4B9B92454B73847AA0367335585965E" ma:contentTypeVersion="12" ma:contentTypeDescription="Create a new document." ma:contentTypeScope="" ma:versionID="e03bd757301da460c704f3115d541a61">
   <xsd:schema xmlns:xsd="http://www.w3.org/2001/XMLSchema" xmlns:xs="http://www.w3.org/2001/XMLSchema" xmlns:p="http://schemas.microsoft.com/office/2006/metadata/properties" xmlns:ns2="7e0397fa-c04e-494e-b1f1-774ad14ae133" xmlns:ns3="8413540a-1bb6-4053-94a1-f89835fea1c0" targetNamespace="http://schemas.microsoft.com/office/2006/metadata/properties" ma:root="true" ma:fieldsID="8a43826bbb8ef7d01dc3ce4144ed7f57" ns2:_="" ns3:_="">
     <xsd:import namespace="7e0397fa-c04e-494e-b1f1-774ad14ae133"/>
@@ -8173,7 +9395,7 @@
 </ct:contentTypeSchema>
 </file>
 
-<file path=customXml/item2.xml><?xml version="1.0" encoding="utf-8"?>
+<file path=customXml/item3.xml><?xml version="1.0" encoding="utf-8"?>
 <?mso-contentType ?>
 <FormTemplates xmlns="http://schemas.microsoft.com/sharepoint/v3/contenttype/forms">
   <Display>DocumentLibraryForm</Display>
@@ -8182,13 +9404,24 @@
 </FormTemplates>
 </file>
 
-<file path=customXml/item3.xml><?xml version="1.0" encoding="utf-8"?>
-<p:properties xmlns:p="http://schemas.microsoft.com/office/2006/metadata/properties" xmlns:xsi="http://www.w3.org/2001/XMLSchema-instance" xmlns:pc="http://schemas.microsoft.com/office/infopath/2007/PartnerControls">
-  <documentManagement/>
-</p:properties>
+<file path=customXml/itemProps1.xml><?xml version="1.0" encoding="utf-8"?>
+<ds:datastoreItem xmlns:ds="http://schemas.openxmlformats.org/officeDocument/2006/customXml" ds:itemID="{68B22CCF-3790-4DAF-9B94-BBE8105DACDB}">
+  <ds:schemaRefs>
+    <ds:schemaRef ds:uri="http://purl.org/dc/elements/1.1/"/>
+    <ds:schemaRef ds:uri="http://schemas.openxmlformats.org/package/2006/metadata/core-properties"/>
+    <ds:schemaRef ds:uri="http://schemas.microsoft.com/office/2006/documentManagement/types"/>
+    <ds:schemaRef ds:uri="7e0397fa-c04e-494e-b1f1-774ad14ae133"/>
+    <ds:schemaRef ds:uri="http://www.w3.org/XML/1998/namespace"/>
+    <ds:schemaRef ds:uri="http://schemas.microsoft.com/office/infopath/2007/PartnerControls"/>
+    <ds:schemaRef ds:uri="http://purl.org/dc/dcmitype/"/>
+    <ds:schemaRef ds:uri="8413540a-1bb6-4053-94a1-f89835fea1c0"/>
+    <ds:schemaRef ds:uri="http://schemas.microsoft.com/office/2006/metadata/properties"/>
+    <ds:schemaRef ds:uri="http://purl.org/dc/terms/"/>
+  </ds:schemaRefs>
+</ds:datastoreItem>
 </file>
 
-<file path=customXml/itemProps1.xml><?xml version="1.0" encoding="utf-8"?>
+<file path=customXml/itemProps2.xml><?xml version="1.0" encoding="utf-8"?>
 <ds:datastoreItem xmlns:ds="http://schemas.openxmlformats.org/officeDocument/2006/customXml" ds:itemID="{A66B1A69-4B86-4CD0-9260-0F88A0083DD6}">
   <ds:schemaRefs>
     <ds:schemaRef ds:uri="http://schemas.microsoft.com/office/2006/metadata/contentType"/>
@@ -8207,27 +9440,10 @@
 </ds:datastoreItem>
 </file>
 
-<file path=customXml/itemProps2.xml><?xml version="1.0" encoding="utf-8"?>
+<file path=customXml/itemProps3.xml><?xml version="1.0" encoding="utf-8"?>
 <ds:datastoreItem xmlns:ds="http://schemas.openxmlformats.org/officeDocument/2006/customXml" ds:itemID="{19285E5B-5F99-40AB-B4B4-B67FE3E29063}">
   <ds:schemaRefs>
     <ds:schemaRef ds:uri="http://schemas.microsoft.com/sharepoint/v3/contenttype/forms"/>
   </ds:schemaRefs>
 </ds:datastoreItem>
-</file>
-
-<file path=customXml/itemProps3.xml><?xml version="1.0" encoding="utf-8"?>
-<ds:datastoreItem xmlns:ds="http://schemas.openxmlformats.org/officeDocument/2006/customXml" ds:itemID="{68B22CCF-3790-4DAF-9B94-BBE8105DACDB}">
-  <ds:schemaRefs>
-    <ds:schemaRef ds:uri="http://purl.org/dc/elements/1.1/"/>
-    <ds:schemaRef ds:uri="http://schemas.openxmlformats.org/package/2006/metadata/core-properties"/>
-    <ds:schemaRef ds:uri="http://schemas.microsoft.com/office/2006/documentManagement/types"/>
-    <ds:schemaRef ds:uri="7e0397fa-c04e-494e-b1f1-774ad14ae133"/>
-    <ds:schemaRef ds:uri="http://www.w3.org/XML/1998/namespace"/>
-    <ds:schemaRef ds:uri="http://schemas.microsoft.com/office/infopath/2007/PartnerControls"/>
-    <ds:schemaRef ds:uri="http://purl.org/dc/dcmitype/"/>
-    <ds:schemaRef ds:uri="8413540a-1bb6-4053-94a1-f89835fea1c0"/>
-    <ds:schemaRef ds:uri="http://schemas.microsoft.com/office/2006/metadata/properties"/>
-    <ds:schemaRef ds:uri="http://purl.org/dc/terms/"/>
-  </ds:schemaRefs>
-</ds:datastoreItem>
 </file>
</xml_diff>